<commit_message>
Added if statements and while loops to Week 2 PPT skeleton
</commit_message>
<xml_diff>
--- a/PPTs/Week2.pptx
+++ b/PPTs/Week2.pptx
@@ -10,9 +10,11 @@
     <p:sldId id="263" r:id="rId4"/>
     <p:sldId id="258" r:id="rId5"/>
     <p:sldId id="259" r:id="rId6"/>
-    <p:sldId id="260" r:id="rId7"/>
-    <p:sldId id="261" r:id="rId8"/>
-    <p:sldId id="262" r:id="rId9"/>
+    <p:sldId id="264" r:id="rId7"/>
+    <p:sldId id="265" r:id="rId8"/>
+    <p:sldId id="260" r:id="rId9"/>
+    <p:sldId id="261" r:id="rId10"/>
+    <p:sldId id="262" r:id="rId11"/>
   </p:sldIdLst>
   <p:sldSz cx="12192000" cy="6858000"/>
   <p:notesSz cx="6858000" cy="9144000"/>
@@ -111,6 +113,11 @@
       </a:defRPr>
     </a:lvl9pPr>
   </p:defaultTextStyle>
+  <p:extLst>
+    <p:ext uri="{EFAFB233-063F-42B5-8137-9DF3F51BA10A}">
+      <p15:sldGuideLst xmlns:p15="http://schemas.microsoft.com/office/powerpoint/2012/main"/>
+    </p:ext>
+  </p:extLst>
 </p:presentation>
 </file>
 
@@ -13731,6 +13738,90 @@
 </p:sld>
 </file>
 
+<file path=ppt/slides/slide10.xml><?xml version="1.0" encoding="utf-8"?>
+<p:sld xmlns:a="http://schemas.openxmlformats.org/drawingml/2006/main" xmlns:r="http://schemas.openxmlformats.org/officeDocument/2006/relationships" xmlns:p="http://schemas.openxmlformats.org/presentationml/2006/main">
+  <p:cSld>
+    <p:spTree>
+      <p:nvGrpSpPr>
+        <p:cNvPr id="1" name=""/>
+        <p:cNvGrpSpPr/>
+        <p:nvPr/>
+      </p:nvGrpSpPr>
+      <p:grpSpPr>
+        <a:xfrm>
+          <a:off x="0" y="0"/>
+          <a:ext cx="0" cy="0"/>
+          <a:chOff x="0" y="0"/>
+          <a:chExt cx="0" cy="0"/>
+        </a:xfrm>
+      </p:grpSpPr>
+      <p:sp>
+        <p:nvSpPr>
+          <p:cNvPr id="2" name="Title 1">
+            <a:extLst>
+              <a:ext uri="{FF2B5EF4-FFF2-40B4-BE49-F238E27FC236}">
+                <a16:creationId xmlns:a16="http://schemas.microsoft.com/office/drawing/2014/main" id="{52678166-D736-F710-F88F-664C524FE190}"/>
+              </a:ext>
+            </a:extLst>
+          </p:cNvPr>
+          <p:cNvSpPr>
+            <a:spLocks noGrp="1"/>
+          </p:cNvSpPr>
+          <p:nvPr>
+            <p:ph type="title"/>
+          </p:nvPr>
+        </p:nvSpPr>
+        <p:spPr/>
+        <p:txBody>
+          <a:bodyPr/>
+          <a:lstStyle/>
+          <a:p>
+            <a:r>
+              <a:rPr lang="en-US" dirty="0"/>
+              <a:t>Useful Package #2: Pandas</a:t>
+            </a:r>
+            <a:endParaRPr lang="en-CA" dirty="0"/>
+          </a:p>
+        </p:txBody>
+      </p:sp>
+      <p:sp>
+        <p:nvSpPr>
+          <p:cNvPr id="3" name="Content Placeholder 2">
+            <a:extLst>
+              <a:ext uri="{FF2B5EF4-FFF2-40B4-BE49-F238E27FC236}">
+                <a16:creationId xmlns:a16="http://schemas.microsoft.com/office/drawing/2014/main" id="{C86DB99C-37E5-75D7-BD8E-C20E5D0F080E}"/>
+              </a:ext>
+            </a:extLst>
+          </p:cNvPr>
+          <p:cNvSpPr>
+            <a:spLocks noGrp="1"/>
+          </p:cNvSpPr>
+          <p:nvPr>
+            <p:ph idx="1"/>
+          </p:nvPr>
+        </p:nvSpPr>
+        <p:spPr/>
+        <p:txBody>
+          <a:bodyPr/>
+          <a:lstStyle/>
+          <a:p>
+            <a:endParaRPr lang="en-CA"/>
+          </a:p>
+        </p:txBody>
+      </p:sp>
+    </p:spTree>
+    <p:extLst>
+      <p:ext uri="{BB962C8B-B14F-4D97-AF65-F5344CB8AC3E}">
+        <p14:creationId xmlns:p14="http://schemas.microsoft.com/office/powerpoint/2010/main" val="2392344435"/>
+      </p:ext>
+    </p:extLst>
+  </p:cSld>
+  <p:clrMapOvr>
+    <a:masterClrMapping/>
+  </p:clrMapOvr>
+</p:sld>
+</file>
+
 <file path=ppt/slides/slide2.xml><?xml version="1.0" encoding="utf-8"?>
 <p:sld xmlns:a="http://schemas.openxmlformats.org/drawingml/2006/main" xmlns:r="http://schemas.openxmlformats.org/officeDocument/2006/relationships" xmlns:p="http://schemas.openxmlformats.org/presentationml/2006/main">
   <p:cSld>
@@ -14098,6 +14189,174 @@
           <p:cNvPr id="2" name="Title 1">
             <a:extLst>
               <a:ext uri="{FF2B5EF4-FFF2-40B4-BE49-F238E27FC236}">
+                <a16:creationId xmlns:a16="http://schemas.microsoft.com/office/drawing/2014/main" id="{EACDBA7B-0082-624A-5EE4-1C9EC0FD01F6}"/>
+              </a:ext>
+            </a:extLst>
+          </p:cNvPr>
+          <p:cNvSpPr>
+            <a:spLocks noGrp="1"/>
+          </p:cNvSpPr>
+          <p:nvPr>
+            <p:ph type="title"/>
+          </p:nvPr>
+        </p:nvSpPr>
+        <p:spPr/>
+        <p:txBody>
+          <a:bodyPr/>
+          <a:lstStyle/>
+          <a:p>
+            <a:r>
+              <a:rPr lang="en-US" dirty="0"/>
+              <a:t>The “if” Statement</a:t>
+            </a:r>
+            <a:endParaRPr lang="en-CA" dirty="0"/>
+          </a:p>
+        </p:txBody>
+      </p:sp>
+      <p:sp>
+        <p:nvSpPr>
+          <p:cNvPr id="3" name="Content Placeholder 2">
+            <a:extLst>
+              <a:ext uri="{FF2B5EF4-FFF2-40B4-BE49-F238E27FC236}">
+                <a16:creationId xmlns:a16="http://schemas.microsoft.com/office/drawing/2014/main" id="{382A7585-AB19-7E25-8594-628D8D9940E7}"/>
+              </a:ext>
+            </a:extLst>
+          </p:cNvPr>
+          <p:cNvSpPr>
+            <a:spLocks noGrp="1"/>
+          </p:cNvSpPr>
+          <p:nvPr>
+            <p:ph idx="1"/>
+          </p:nvPr>
+        </p:nvSpPr>
+        <p:spPr/>
+        <p:txBody>
+          <a:bodyPr/>
+          <a:lstStyle/>
+          <a:p>
+            <a:endParaRPr lang="en-CA"/>
+          </a:p>
+        </p:txBody>
+      </p:sp>
+    </p:spTree>
+    <p:extLst>
+      <p:ext uri="{BB962C8B-B14F-4D97-AF65-F5344CB8AC3E}">
+        <p14:creationId xmlns:p14="http://schemas.microsoft.com/office/powerpoint/2010/main" val="1359062667"/>
+      </p:ext>
+    </p:extLst>
+  </p:cSld>
+  <p:clrMapOvr>
+    <a:masterClrMapping/>
+  </p:clrMapOvr>
+</p:sld>
+</file>
+
+<file path=ppt/slides/slide7.xml><?xml version="1.0" encoding="utf-8"?>
+<p:sld xmlns:a="http://schemas.openxmlformats.org/drawingml/2006/main" xmlns:r="http://schemas.openxmlformats.org/officeDocument/2006/relationships" xmlns:p="http://schemas.openxmlformats.org/presentationml/2006/main">
+  <p:cSld>
+    <p:spTree>
+      <p:nvGrpSpPr>
+        <p:cNvPr id="1" name=""/>
+        <p:cNvGrpSpPr/>
+        <p:nvPr/>
+      </p:nvGrpSpPr>
+      <p:grpSpPr>
+        <a:xfrm>
+          <a:off x="0" y="0"/>
+          <a:ext cx="0" cy="0"/>
+          <a:chOff x="0" y="0"/>
+          <a:chExt cx="0" cy="0"/>
+        </a:xfrm>
+      </p:grpSpPr>
+      <p:sp>
+        <p:nvSpPr>
+          <p:cNvPr id="2" name="Title 1">
+            <a:extLst>
+              <a:ext uri="{FF2B5EF4-FFF2-40B4-BE49-F238E27FC236}">
+                <a16:creationId xmlns:a16="http://schemas.microsoft.com/office/drawing/2014/main" id="{7BF5A8DB-6BA8-960F-3603-143D0D6494E8}"/>
+              </a:ext>
+            </a:extLst>
+          </p:cNvPr>
+          <p:cNvSpPr>
+            <a:spLocks noGrp="1"/>
+          </p:cNvSpPr>
+          <p:nvPr>
+            <p:ph type="title"/>
+          </p:nvPr>
+        </p:nvSpPr>
+        <p:spPr/>
+        <p:txBody>
+          <a:bodyPr/>
+          <a:lstStyle/>
+          <a:p>
+            <a:r>
+              <a:rPr lang="en-US" dirty="0"/>
+              <a:t>The “for” Loop</a:t>
+            </a:r>
+            <a:endParaRPr lang="en-CA" dirty="0"/>
+          </a:p>
+        </p:txBody>
+      </p:sp>
+      <p:sp>
+        <p:nvSpPr>
+          <p:cNvPr id="3" name="Content Placeholder 2">
+            <a:extLst>
+              <a:ext uri="{FF2B5EF4-FFF2-40B4-BE49-F238E27FC236}">
+                <a16:creationId xmlns:a16="http://schemas.microsoft.com/office/drawing/2014/main" id="{5850E0D4-340F-AB69-FF94-72D89A2264FB}"/>
+              </a:ext>
+            </a:extLst>
+          </p:cNvPr>
+          <p:cNvSpPr>
+            <a:spLocks noGrp="1"/>
+          </p:cNvSpPr>
+          <p:nvPr>
+            <p:ph idx="1"/>
+          </p:nvPr>
+        </p:nvSpPr>
+        <p:spPr/>
+        <p:txBody>
+          <a:bodyPr/>
+          <a:lstStyle/>
+          <a:p>
+            <a:endParaRPr lang="en-CA"/>
+          </a:p>
+        </p:txBody>
+      </p:sp>
+    </p:spTree>
+    <p:extLst>
+      <p:ext uri="{BB962C8B-B14F-4D97-AF65-F5344CB8AC3E}">
+        <p14:creationId xmlns:p14="http://schemas.microsoft.com/office/powerpoint/2010/main" val="2561195603"/>
+      </p:ext>
+    </p:extLst>
+  </p:cSld>
+  <p:clrMapOvr>
+    <a:masterClrMapping/>
+  </p:clrMapOvr>
+</p:sld>
+</file>
+
+<file path=ppt/slides/slide8.xml><?xml version="1.0" encoding="utf-8"?>
+<p:sld xmlns:a="http://schemas.openxmlformats.org/drawingml/2006/main" xmlns:r="http://schemas.openxmlformats.org/officeDocument/2006/relationships" xmlns:p="http://schemas.openxmlformats.org/presentationml/2006/main">
+  <p:cSld>
+    <p:spTree>
+      <p:nvGrpSpPr>
+        <p:cNvPr id="1" name=""/>
+        <p:cNvGrpSpPr/>
+        <p:nvPr/>
+      </p:nvGrpSpPr>
+      <p:grpSpPr>
+        <a:xfrm>
+          <a:off x="0" y="0"/>
+          <a:ext cx="0" cy="0"/>
+          <a:chOff x="0" y="0"/>
+          <a:chExt cx="0" cy="0"/>
+        </a:xfrm>
+      </p:grpSpPr>
+      <p:sp>
+        <p:nvSpPr>
+          <p:cNvPr id="2" name="Title 1">
+            <a:extLst>
+              <a:ext uri="{FF2B5EF4-FFF2-40B4-BE49-F238E27FC236}">
                 <a16:creationId xmlns:a16="http://schemas.microsoft.com/office/drawing/2014/main" id="{3F370277-BBB5-4098-E302-FC31FB80C943}"/>
               </a:ext>
             </a:extLst>
@@ -14160,7 +14419,7 @@
 </p:sld>
 </file>
 
-<file path=ppt/slides/slide7.xml><?xml version="1.0" encoding="utf-8"?>
+<file path=ppt/slides/slide9.xml><?xml version="1.0" encoding="utf-8"?>
 <p:sld xmlns:a="http://schemas.openxmlformats.org/drawingml/2006/main" xmlns:r="http://schemas.openxmlformats.org/officeDocument/2006/relationships" xmlns:p="http://schemas.openxmlformats.org/presentationml/2006/main">
   <p:cSld>
     <p:spTree>
@@ -14235,90 +14494,6 @@
     <p:extLst>
       <p:ext uri="{BB962C8B-B14F-4D97-AF65-F5344CB8AC3E}">
         <p14:creationId xmlns:p14="http://schemas.microsoft.com/office/powerpoint/2010/main" val="495497297"/>
-      </p:ext>
-    </p:extLst>
-  </p:cSld>
-  <p:clrMapOvr>
-    <a:masterClrMapping/>
-  </p:clrMapOvr>
-</p:sld>
-</file>
-
-<file path=ppt/slides/slide8.xml><?xml version="1.0" encoding="utf-8"?>
-<p:sld xmlns:a="http://schemas.openxmlformats.org/drawingml/2006/main" xmlns:r="http://schemas.openxmlformats.org/officeDocument/2006/relationships" xmlns:p="http://schemas.openxmlformats.org/presentationml/2006/main">
-  <p:cSld>
-    <p:spTree>
-      <p:nvGrpSpPr>
-        <p:cNvPr id="1" name=""/>
-        <p:cNvGrpSpPr/>
-        <p:nvPr/>
-      </p:nvGrpSpPr>
-      <p:grpSpPr>
-        <a:xfrm>
-          <a:off x="0" y="0"/>
-          <a:ext cx="0" cy="0"/>
-          <a:chOff x="0" y="0"/>
-          <a:chExt cx="0" cy="0"/>
-        </a:xfrm>
-      </p:grpSpPr>
-      <p:sp>
-        <p:nvSpPr>
-          <p:cNvPr id="2" name="Title 1">
-            <a:extLst>
-              <a:ext uri="{FF2B5EF4-FFF2-40B4-BE49-F238E27FC236}">
-                <a16:creationId xmlns:a16="http://schemas.microsoft.com/office/drawing/2014/main" id="{52678166-D736-F710-F88F-664C524FE190}"/>
-              </a:ext>
-            </a:extLst>
-          </p:cNvPr>
-          <p:cNvSpPr>
-            <a:spLocks noGrp="1"/>
-          </p:cNvSpPr>
-          <p:nvPr>
-            <p:ph type="title"/>
-          </p:nvPr>
-        </p:nvSpPr>
-        <p:spPr/>
-        <p:txBody>
-          <a:bodyPr/>
-          <a:lstStyle/>
-          <a:p>
-            <a:r>
-              <a:rPr lang="en-US" dirty="0"/>
-              <a:t>Useful Package #2: Pandas</a:t>
-            </a:r>
-            <a:endParaRPr lang="en-CA" dirty="0"/>
-          </a:p>
-        </p:txBody>
-      </p:sp>
-      <p:sp>
-        <p:nvSpPr>
-          <p:cNvPr id="3" name="Content Placeholder 2">
-            <a:extLst>
-              <a:ext uri="{FF2B5EF4-FFF2-40B4-BE49-F238E27FC236}">
-                <a16:creationId xmlns:a16="http://schemas.microsoft.com/office/drawing/2014/main" id="{C86DB99C-37E5-75D7-BD8E-C20E5D0F080E}"/>
-              </a:ext>
-            </a:extLst>
-          </p:cNvPr>
-          <p:cNvSpPr>
-            <a:spLocks noGrp="1"/>
-          </p:cNvSpPr>
-          <p:nvPr>
-            <p:ph idx="1"/>
-          </p:nvPr>
-        </p:nvSpPr>
-        <p:spPr/>
-        <p:txBody>
-          <a:bodyPr/>
-          <a:lstStyle/>
-          <a:p>
-            <a:endParaRPr lang="en-CA"/>
-          </a:p>
-        </p:txBody>
-      </p:sp>
-    </p:spTree>
-    <p:extLst>
-      <p:ext uri="{BB962C8B-B14F-4D97-AF65-F5344CB8AC3E}">
-        <p14:creationId xmlns:p14="http://schemas.microsoft.com/office/powerpoint/2010/main" val="2392344435"/>
       </p:ext>
     </p:extLst>
   </p:cSld>

</xml_diff>

<commit_message>
Last-minute changes for Week 2
</commit_message>
<xml_diff>
--- a/PPTs/Week2.pptx
+++ b/PPTs/Week2.pptx
@@ -5,7 +5,7 @@
     <p:sldMasterId id="2147483660" r:id="rId1"/>
   </p:sldMasterIdLst>
   <p:notesMasterIdLst>
-    <p:notesMasterId r:id="rId37"/>
+    <p:notesMasterId r:id="rId38"/>
   </p:notesMasterIdLst>
   <p:sldIdLst>
     <p:sldId id="256" r:id="rId2"/>
@@ -14,10 +14,10 @@
     <p:sldId id="272" r:id="rId5"/>
     <p:sldId id="277" r:id="rId6"/>
     <p:sldId id="278" r:id="rId7"/>
-    <p:sldId id="269" r:id="rId8"/>
-    <p:sldId id="270" r:id="rId9"/>
-    <p:sldId id="263" r:id="rId10"/>
-    <p:sldId id="271" r:id="rId11"/>
+    <p:sldId id="263" r:id="rId8"/>
+    <p:sldId id="271" r:id="rId9"/>
+    <p:sldId id="294" r:id="rId10"/>
+    <p:sldId id="295" r:id="rId11"/>
     <p:sldId id="267" r:id="rId12"/>
     <p:sldId id="279" r:id="rId13"/>
     <p:sldId id="259" r:id="rId14"/>
@@ -42,7 +42,8 @@
     <p:sldId id="291" r:id="rId33"/>
     <p:sldId id="292" r:id="rId34"/>
     <p:sldId id="293" r:id="rId35"/>
-    <p:sldId id="268" r:id="rId36"/>
+    <p:sldId id="269" r:id="rId36"/>
+    <p:sldId id="270" r:id="rId37"/>
   </p:sldIdLst>
   <p:sldSz cx="12192000" cy="6858000"/>
   <p:notesSz cx="6858000" cy="9144000"/>
@@ -231,7 +232,7 @@
           <a:p>
             <a:fld id="{4D01BC0A-805E-49EA-A265-B1AEB56E0304}" type="datetimeFigureOut">
               <a:rPr lang="en-CA" smtClean="0"/>
-              <a:t>2022-06-23</a:t>
+              <a:t>2022-06-30</a:t>
             </a:fld>
             <a:endParaRPr lang="en-CA"/>
           </a:p>
@@ -918,7 +919,7 @@
           <a:p>
             <a:fld id="{D78AE350-C0F0-4D56-B0B0-9FEC737C2AB0}" type="datetimeFigureOut">
               <a:rPr lang="en-CA" smtClean="0"/>
-              <a:t>2022-06-23</a:t>
+              <a:t>2022-06-30</a:t>
             </a:fld>
             <a:endParaRPr lang="en-CA"/>
           </a:p>
@@ -2006,7 +2007,7 @@
           <a:p>
             <a:fld id="{D78AE350-C0F0-4D56-B0B0-9FEC737C2AB0}" type="datetimeFigureOut">
               <a:rPr lang="en-CA" smtClean="0"/>
-              <a:t>2022-06-23</a:t>
+              <a:t>2022-06-30</a:t>
             </a:fld>
             <a:endParaRPr lang="en-CA"/>
           </a:p>
@@ -2986,7 +2987,7 @@
           <a:p>
             <a:fld id="{D78AE350-C0F0-4D56-B0B0-9FEC737C2AB0}" type="datetimeFigureOut">
               <a:rPr lang="en-CA" smtClean="0"/>
-              <a:t>2022-06-23</a:t>
+              <a:t>2022-06-30</a:t>
             </a:fld>
             <a:endParaRPr lang="en-CA"/>
           </a:p>
@@ -4120,7 +4121,7 @@
           <a:p>
             <a:fld id="{D78AE350-C0F0-4D56-B0B0-9FEC737C2AB0}" type="datetimeFigureOut">
               <a:rPr lang="en-CA" smtClean="0"/>
-              <a:t>2022-06-23</a:t>
+              <a:t>2022-06-30</a:t>
             </a:fld>
             <a:endParaRPr lang="en-CA"/>
           </a:p>
@@ -5153,7 +5154,7 @@
           <a:p>
             <a:fld id="{D78AE350-C0F0-4D56-B0B0-9FEC737C2AB0}" type="datetimeFigureOut">
               <a:rPr lang="en-CA" smtClean="0"/>
-              <a:t>2022-06-23</a:t>
+              <a:t>2022-06-30</a:t>
             </a:fld>
             <a:endParaRPr lang="en-CA"/>
           </a:p>
@@ -5813,7 +5814,7 @@
           <a:p>
             <a:fld id="{D78AE350-C0F0-4D56-B0B0-9FEC737C2AB0}" type="datetimeFigureOut">
               <a:rPr lang="en-CA" smtClean="0"/>
-              <a:t>2022-06-23</a:t>
+              <a:t>2022-06-30</a:t>
             </a:fld>
             <a:endParaRPr lang="en-CA"/>
           </a:p>
@@ -6674,7 +6675,7 @@
           <a:p>
             <a:fld id="{D78AE350-C0F0-4D56-B0B0-9FEC737C2AB0}" type="datetimeFigureOut">
               <a:rPr lang="en-CA" smtClean="0"/>
-              <a:t>2022-06-23</a:t>
+              <a:t>2022-06-30</a:t>
             </a:fld>
             <a:endParaRPr lang="en-CA"/>
           </a:p>
@@ -6864,7 +6865,7 @@
           <a:p>
             <a:fld id="{D78AE350-C0F0-4D56-B0B0-9FEC737C2AB0}" type="datetimeFigureOut">
               <a:rPr lang="en-CA" smtClean="0"/>
-              <a:t>2022-06-23</a:t>
+              <a:t>2022-06-30</a:t>
             </a:fld>
             <a:endParaRPr lang="en-CA"/>
           </a:p>
@@ -7836,7 +7837,7 @@
           <a:p>
             <a:fld id="{D78AE350-C0F0-4D56-B0B0-9FEC737C2AB0}" type="datetimeFigureOut">
               <a:rPr lang="en-CA" smtClean="0"/>
-              <a:t>2022-06-23</a:t>
+              <a:t>2022-06-30</a:t>
             </a:fld>
             <a:endParaRPr lang="en-CA"/>
           </a:p>
@@ -8047,7 +8048,7 @@
           <a:p>
             <a:fld id="{D78AE350-C0F0-4D56-B0B0-9FEC737C2AB0}" type="datetimeFigureOut">
               <a:rPr lang="en-CA" smtClean="0"/>
-              <a:t>2022-06-23</a:t>
+              <a:t>2022-06-30</a:t>
             </a:fld>
             <a:endParaRPr lang="en-CA"/>
           </a:p>
@@ -9081,7 +9082,7 @@
           <a:p>
             <a:fld id="{D78AE350-C0F0-4D56-B0B0-9FEC737C2AB0}" type="datetimeFigureOut">
               <a:rPr lang="en-CA" smtClean="0"/>
-              <a:t>2022-06-23</a:t>
+              <a:t>2022-06-30</a:t>
             </a:fld>
             <a:endParaRPr lang="en-CA"/>
           </a:p>
@@ -9353,7 +9354,7 @@
           <a:p>
             <a:fld id="{D78AE350-C0F0-4D56-B0B0-9FEC737C2AB0}" type="datetimeFigureOut">
               <a:rPr lang="en-CA" smtClean="0"/>
-              <a:t>2022-06-23</a:t>
+              <a:t>2022-06-30</a:t>
             </a:fld>
             <a:endParaRPr lang="en-CA"/>
           </a:p>
@@ -9763,7 +9764,7 @@
           <a:p>
             <a:fld id="{D78AE350-C0F0-4D56-B0B0-9FEC737C2AB0}" type="datetimeFigureOut">
               <a:rPr lang="en-CA" smtClean="0"/>
-              <a:t>2022-06-23</a:t>
+              <a:t>2022-06-30</a:t>
             </a:fld>
             <a:endParaRPr lang="en-CA"/>
           </a:p>
@@ -9890,7 +9891,7 @@
           <a:p>
             <a:fld id="{D78AE350-C0F0-4D56-B0B0-9FEC737C2AB0}" type="datetimeFigureOut">
               <a:rPr lang="en-CA" smtClean="0"/>
-              <a:t>2022-06-23</a:t>
+              <a:t>2022-06-30</a:t>
             </a:fld>
             <a:endParaRPr lang="en-CA"/>
           </a:p>
@@ -9985,7 +9986,7 @@
           <a:p>
             <a:fld id="{D78AE350-C0F0-4D56-B0B0-9FEC737C2AB0}" type="datetimeFigureOut">
               <a:rPr lang="en-CA" smtClean="0"/>
-              <a:t>2022-06-23</a:t>
+              <a:t>2022-06-30</a:t>
             </a:fld>
             <a:endParaRPr lang="en-CA"/>
           </a:p>
@@ -11066,7 +11067,7 @@
           <a:p>
             <a:fld id="{D78AE350-C0F0-4D56-B0B0-9FEC737C2AB0}" type="datetimeFigureOut">
               <a:rPr lang="en-CA" smtClean="0"/>
-              <a:t>2022-06-23</a:t>
+              <a:t>2022-06-30</a:t>
             </a:fld>
             <a:endParaRPr lang="en-CA"/>
           </a:p>
@@ -12174,7 +12175,7 @@
           <a:p>
             <a:fld id="{D78AE350-C0F0-4D56-B0B0-9FEC737C2AB0}" type="datetimeFigureOut">
               <a:rPr lang="en-CA" smtClean="0"/>
-              <a:t>2022-06-23</a:t>
+              <a:t>2022-06-30</a:t>
             </a:fld>
             <a:endParaRPr lang="en-CA"/>
           </a:p>
@@ -13171,7 +13172,7 @@
           <a:p>
             <a:fld id="{D78AE350-C0F0-4D56-B0B0-9FEC737C2AB0}" type="datetimeFigureOut">
               <a:rPr lang="en-CA" smtClean="0"/>
-              <a:t>2022-06-23</a:t>
+              <a:t>2022-06-30</a:t>
             </a:fld>
             <a:endParaRPr lang="en-CA"/>
           </a:p>
@@ -14275,930 +14276,101 @@
           <a:lstStyle/>
           <a:p>
             <a:r>
+              <a:rPr lang="en-US" dirty="0"/>
+              <a:t>!</a:t>
+            </a:r>
+            <a:r>
               <a:rPr lang="en-CA" dirty="0"/>
-              <a:t>Git terminology</a:t>
+              <a:t>! Important !! (</a:t>
+            </a:r>
+            <a:r>
+              <a:rPr lang="en-CA" dirty="0" err="1"/>
+              <a:t>cont</a:t>
+            </a:r>
+            <a:r>
+              <a:rPr lang="en-CA" dirty="0"/>
+              <a:t>)</a:t>
             </a:r>
           </a:p>
         </p:txBody>
       </p:sp>
       <p:sp>
         <p:nvSpPr>
-          <p:cNvPr id="4" name="Rectangle 3">
+          <p:cNvPr id="15" name="Content Placeholder 2">
             <a:extLst>
               <a:ext uri="{FF2B5EF4-FFF2-40B4-BE49-F238E27FC236}">
-                <a16:creationId xmlns:a16="http://schemas.microsoft.com/office/drawing/2014/main" id="{3DD6FB4A-5517-8CC4-439A-4F42CF26B732}"/>
+                <a16:creationId xmlns:a16="http://schemas.microsoft.com/office/drawing/2014/main" id="{9DEE4A0D-DF8E-FA74-7AE7-4A798861F8BC}"/>
               </a:ext>
             </a:extLst>
           </p:cNvPr>
-          <p:cNvSpPr/>
-          <p:nvPr/>
+          <p:cNvSpPr>
+            <a:spLocks noGrp="1"/>
+          </p:cNvSpPr>
+          <p:nvPr>
+            <p:ph idx="1"/>
+          </p:nvPr>
         </p:nvSpPr>
         <p:spPr>
           <a:xfrm>
-            <a:off x="1846907" y="2670771"/>
-            <a:ext cx="2643612" cy="1475716"/>
+            <a:off x="136189" y="2532434"/>
+            <a:ext cx="11770466" cy="1679644"/>
           </a:xfrm>
-          <a:prstGeom prst="rect">
-            <a:avLst/>
-          </a:prstGeom>
-        </p:spPr>
-        <p:style>
-          <a:lnRef idx="2">
-            <a:schemeClr val="accent1">
-              <a:shade val="50000"/>
-            </a:schemeClr>
-          </a:lnRef>
-          <a:fillRef idx="1">
-            <a:schemeClr val="accent1"/>
-          </a:fillRef>
-          <a:effectRef idx="0">
-            <a:schemeClr val="accent1"/>
-          </a:effectRef>
-          <a:fontRef idx="minor">
-            <a:schemeClr val="lt1"/>
-          </a:fontRef>
-        </p:style>
-        <p:txBody>
-          <a:bodyPr rtlCol="0" anchor="ctr"/>
-          <a:lstStyle/>
-          <a:p>
-            <a:pPr algn="ctr"/>
-            <a:r>
-              <a:rPr lang="en-CA" sz="2400" b="1" dirty="0"/>
-              <a:t>Instructor’s repo</a:t>
-            </a:r>
-          </a:p>
-          <a:p>
-            <a:pPr algn="ctr"/>
-            <a:r>
-              <a:rPr lang="en-CA" sz="2400" dirty="0"/>
-              <a:t>[remote]</a:t>
-            </a:r>
-          </a:p>
-          <a:p>
-            <a:pPr algn="ctr"/>
-            <a:r>
-              <a:rPr lang="en-CA" sz="2400" i="1" dirty="0"/>
-              <a:t>upstream</a:t>
-            </a:r>
-          </a:p>
-        </p:txBody>
-      </p:sp>
-      <p:sp>
-        <p:nvSpPr>
-          <p:cNvPr id="7" name="Rectangle 6">
-            <a:extLst>
-              <a:ext uri="{FF2B5EF4-FFF2-40B4-BE49-F238E27FC236}">
-                <a16:creationId xmlns:a16="http://schemas.microsoft.com/office/drawing/2014/main" id="{751C1034-74BB-199F-DC4C-4772086F5366}"/>
-              </a:ext>
-            </a:extLst>
-          </p:cNvPr>
-          <p:cNvSpPr/>
-          <p:nvPr/>
-        </p:nvSpPr>
-        <p:spPr>
-          <a:xfrm>
-            <a:off x="7701483" y="2670771"/>
-            <a:ext cx="2643612" cy="1475716"/>
-          </a:xfrm>
-          <a:prstGeom prst="rect">
-            <a:avLst/>
-          </a:prstGeom>
-        </p:spPr>
-        <p:style>
-          <a:lnRef idx="2">
-            <a:schemeClr val="accent1">
-              <a:shade val="50000"/>
-            </a:schemeClr>
-          </a:lnRef>
-          <a:fillRef idx="1">
-            <a:schemeClr val="accent1"/>
-          </a:fillRef>
-          <a:effectRef idx="0">
-            <a:schemeClr val="accent1"/>
-          </a:effectRef>
-          <a:fontRef idx="minor">
-            <a:schemeClr val="lt1"/>
-          </a:fontRef>
-        </p:style>
-        <p:txBody>
-          <a:bodyPr rtlCol="0" anchor="ctr"/>
-          <a:lstStyle/>
-          <a:p>
-            <a:pPr algn="ctr"/>
-            <a:r>
-              <a:rPr lang="en-CA" sz="2400" b="1" dirty="0"/>
-              <a:t>My forked repo</a:t>
-            </a:r>
-          </a:p>
-          <a:p>
-            <a:pPr algn="ctr"/>
-            <a:r>
-              <a:rPr lang="en-CA" sz="2400" dirty="0"/>
-              <a:t>[remote]</a:t>
-            </a:r>
-          </a:p>
-          <a:p>
-            <a:pPr algn="ctr"/>
-            <a:r>
-              <a:rPr lang="en-CA" sz="2400" i="1" dirty="0"/>
-              <a:t>main</a:t>
-            </a:r>
-          </a:p>
-        </p:txBody>
-      </p:sp>
-      <p:sp>
-        <p:nvSpPr>
-          <p:cNvPr id="8" name="Rectangle 7">
-            <a:extLst>
-              <a:ext uri="{FF2B5EF4-FFF2-40B4-BE49-F238E27FC236}">
-                <a16:creationId xmlns:a16="http://schemas.microsoft.com/office/drawing/2014/main" id="{AA804AFC-DFC1-58C4-300D-9A86772452D0}"/>
-              </a:ext>
-            </a:extLst>
-          </p:cNvPr>
-          <p:cNvSpPr/>
-          <p:nvPr/>
-        </p:nvSpPr>
-        <p:spPr>
-          <a:xfrm>
-            <a:off x="4774194" y="5068430"/>
-            <a:ext cx="2643612" cy="1475716"/>
-          </a:xfrm>
-          <a:prstGeom prst="rect">
-            <a:avLst/>
-          </a:prstGeom>
-        </p:spPr>
-        <p:style>
-          <a:lnRef idx="2">
-            <a:schemeClr val="accent1">
-              <a:shade val="50000"/>
-            </a:schemeClr>
-          </a:lnRef>
-          <a:fillRef idx="1">
-            <a:schemeClr val="accent1"/>
-          </a:fillRef>
-          <a:effectRef idx="0">
-            <a:schemeClr val="accent1"/>
-          </a:effectRef>
-          <a:fontRef idx="minor">
-            <a:schemeClr val="lt1"/>
-          </a:fontRef>
-        </p:style>
-        <p:txBody>
-          <a:bodyPr rtlCol="0" anchor="ctr"/>
-          <a:lstStyle/>
-          <a:p>
-            <a:pPr algn="ctr"/>
-            <a:r>
-              <a:rPr lang="en-CA" sz="2400" b="1" dirty="0"/>
-              <a:t>My local repo</a:t>
-            </a:r>
-          </a:p>
-          <a:p>
-            <a:pPr algn="ctr"/>
-            <a:r>
-              <a:rPr lang="en-CA" sz="2400" dirty="0"/>
-              <a:t>[local]</a:t>
-            </a:r>
-          </a:p>
-          <a:p>
-            <a:pPr algn="ctr"/>
-            <a:r>
-              <a:rPr lang="en-CA" sz="2400" i="1" dirty="0"/>
-              <a:t>origin</a:t>
-            </a:r>
-          </a:p>
-        </p:txBody>
-      </p:sp>
-      <p:cxnSp>
-        <p:nvCxnSpPr>
-          <p:cNvPr id="10" name="Straight Arrow Connector 9">
-            <a:extLst>
-              <a:ext uri="{FF2B5EF4-FFF2-40B4-BE49-F238E27FC236}">
-                <a16:creationId xmlns:a16="http://schemas.microsoft.com/office/drawing/2014/main" id="{1A51553D-A11D-1118-7317-6C8655A89506}"/>
-              </a:ext>
-            </a:extLst>
-          </p:cNvPr>
-          <p:cNvCxnSpPr/>
-          <p:nvPr/>
-        </p:nvCxnSpPr>
-        <p:spPr>
-          <a:xfrm>
-            <a:off x="2987644" y="4227968"/>
-            <a:ext cx="1566249" cy="1502876"/>
-          </a:xfrm>
-          <a:prstGeom prst="straightConnector1">
-            <a:avLst/>
-          </a:prstGeom>
-          <a:ln w="76200">
-            <a:solidFill>
-              <a:schemeClr val="accent3"/>
-            </a:solidFill>
-            <a:tailEnd type="triangle"/>
-          </a:ln>
-        </p:spPr>
-        <p:style>
-          <a:lnRef idx="1">
-            <a:schemeClr val="accent1"/>
-          </a:lnRef>
-          <a:fillRef idx="0">
-            <a:schemeClr val="accent1"/>
-          </a:fillRef>
-          <a:effectRef idx="0">
-            <a:schemeClr val="accent1"/>
-          </a:effectRef>
-          <a:fontRef idx="minor">
-            <a:schemeClr val="tx1"/>
-          </a:fontRef>
-        </p:style>
-      </p:cxnSp>
-      <p:sp>
-        <p:nvSpPr>
-          <p:cNvPr id="11" name="TextBox 10">
-            <a:extLst>
-              <a:ext uri="{FF2B5EF4-FFF2-40B4-BE49-F238E27FC236}">
-                <a16:creationId xmlns:a16="http://schemas.microsoft.com/office/drawing/2014/main" id="{65301409-27C7-17CB-34FB-603B478B107A}"/>
-              </a:ext>
-            </a:extLst>
-          </p:cNvPr>
-          <p:cNvSpPr txBox="1"/>
-          <p:nvPr/>
-        </p:nvSpPr>
-        <p:spPr>
-          <a:xfrm rot="2645474">
-            <a:off x="3001909" y="4779351"/>
-            <a:ext cx="886781" cy="400110"/>
-          </a:xfrm>
-          <a:prstGeom prst="rect">
-            <a:avLst/>
-          </a:prstGeom>
-          <a:noFill/>
         </p:spPr>
         <p:txBody>
-          <a:bodyPr wrap="none" rtlCol="0">
-            <a:spAutoFit/>
+          <a:bodyPr>
+            <a:normAutofit/>
           </a:bodyPr>
           <a:lstStyle/>
           <a:p>
-            <a:r>
-              <a:rPr lang="en-CA" sz="2000" dirty="0">
-                <a:solidFill>
-                  <a:schemeClr val="tx1">
-                    <a:lumMod val="75000"/>
-                    <a:lumOff val="25000"/>
-                  </a:schemeClr>
-                </a:solidFill>
+            <a:pPr>
+              <a:lnSpc>
+                <a:spcPct val="150000"/>
+              </a:lnSpc>
+            </a:pPr>
+            <a:r>
+              <a:rPr lang="en-US" sz="2000" dirty="0"/>
+              <a:t>From now on, whenever you pull from upstream, you will need to copy and paste new files into your “My code” folder</a:t>
+            </a:r>
+          </a:p>
+          <a:p>
+            <a:pPr>
+              <a:lnSpc>
+                <a:spcPct val="150000"/>
+              </a:lnSpc>
+            </a:pPr>
+            <a:r>
+              <a:rPr lang="en-US" sz="2000" dirty="0"/>
+              <a:t>Otherwise, </a:t>
+            </a:r>
+            <a:r>
+              <a:rPr lang="en-US" sz="2000" dirty="0">
+                <a:latin typeface="Courier New" panose="02070309020205020404" pitchFamily="49" charset="0"/>
+                <a:cs typeface="Courier New" panose="02070309020205020404" pitchFamily="49" charset="0"/>
               </a:rPr>
-              <a:t>Fetch</a:t>
-            </a:r>
-          </a:p>
-        </p:txBody>
-      </p:sp>
-      <p:cxnSp>
-        <p:nvCxnSpPr>
-          <p:cNvPr id="12" name="Straight Arrow Connector 11">
-            <a:extLst>
-              <a:ext uri="{FF2B5EF4-FFF2-40B4-BE49-F238E27FC236}">
-                <a16:creationId xmlns:a16="http://schemas.microsoft.com/office/drawing/2014/main" id="{A79A564B-1D2D-EDA7-1B04-A5F8F54FD852}"/>
-              </a:ext>
-            </a:extLst>
-          </p:cNvPr>
-          <p:cNvCxnSpPr>
-            <a:cxnSpLocks/>
-          </p:cNvCxnSpPr>
-          <p:nvPr/>
-        </p:nvCxnSpPr>
-        <p:spPr>
-          <a:xfrm flipH="1">
-            <a:off x="7499290" y="4227968"/>
-            <a:ext cx="2481732" cy="2061995"/>
-          </a:xfrm>
-          <a:prstGeom prst="straightConnector1">
-            <a:avLst/>
-          </a:prstGeom>
-          <a:ln w="76200">
-            <a:solidFill>
-              <a:schemeClr val="accent3"/>
-            </a:solidFill>
-            <a:tailEnd type="triangle"/>
-          </a:ln>
-        </p:spPr>
-        <p:style>
-          <a:lnRef idx="1">
-            <a:schemeClr val="accent1"/>
-          </a:lnRef>
-          <a:fillRef idx="0">
-            <a:schemeClr val="accent1"/>
-          </a:fillRef>
-          <a:effectRef idx="0">
-            <a:schemeClr val="accent1"/>
-          </a:effectRef>
-          <a:fontRef idx="minor">
-            <a:schemeClr val="tx1"/>
-          </a:fontRef>
-        </p:style>
-      </p:cxnSp>
-      <p:sp>
-        <p:nvSpPr>
-          <p:cNvPr id="16" name="TextBox 15">
-            <a:extLst>
-              <a:ext uri="{FF2B5EF4-FFF2-40B4-BE49-F238E27FC236}">
-                <a16:creationId xmlns:a16="http://schemas.microsoft.com/office/drawing/2014/main" id="{C3E98D18-0A9F-2AF9-5DFE-3C4103A399B2}"/>
-              </a:ext>
-            </a:extLst>
-          </p:cNvPr>
-          <p:cNvSpPr txBox="1"/>
-          <p:nvPr/>
-        </p:nvSpPr>
-        <p:spPr>
-          <a:xfrm rot="19192747">
-            <a:off x="8745392" y="5058910"/>
-            <a:ext cx="595035" cy="400110"/>
-          </a:xfrm>
-          <a:prstGeom prst="rect">
-            <a:avLst/>
-          </a:prstGeom>
-          <a:noFill/>
-        </p:spPr>
-        <p:txBody>
-          <a:bodyPr wrap="none" rtlCol="0">
-            <a:spAutoFit/>
-          </a:bodyPr>
-          <a:lstStyle/>
-          <a:p>
-            <a:r>
-              <a:rPr lang="en-CA" sz="2000" dirty="0">
-                <a:solidFill>
-                  <a:schemeClr val="tx1">
-                    <a:lumMod val="75000"/>
-                    <a:lumOff val="25000"/>
-                  </a:schemeClr>
-                </a:solidFill>
+              <a:t>git pull upstream </a:t>
+            </a:r>
+            <a:r>
+              <a:rPr lang="en-US" sz="2000" dirty="0">
+                <a:cs typeface="Courier New" panose="02070309020205020404" pitchFamily="49" charset="0"/>
               </a:rPr>
-              <a:t>Pull</a:t>
-            </a:r>
-          </a:p>
-        </p:txBody>
-      </p:sp>
-      <p:cxnSp>
-        <p:nvCxnSpPr>
-          <p:cNvPr id="17" name="Straight Arrow Connector 16">
-            <a:extLst>
-              <a:ext uri="{FF2B5EF4-FFF2-40B4-BE49-F238E27FC236}">
-                <a16:creationId xmlns:a16="http://schemas.microsoft.com/office/drawing/2014/main" id="{7AD0FFE9-D16C-8539-99D5-F2BC465C575D}"/>
-              </a:ext>
-            </a:extLst>
-          </p:cNvPr>
-          <p:cNvCxnSpPr>
-            <a:cxnSpLocks/>
-          </p:cNvCxnSpPr>
-          <p:nvPr/>
-        </p:nvCxnSpPr>
-        <p:spPr>
-          <a:xfrm flipV="1">
-            <a:off x="7499290" y="4227968"/>
-            <a:ext cx="1413801" cy="1203637"/>
-          </a:xfrm>
-          <a:prstGeom prst="straightConnector1">
-            <a:avLst/>
-          </a:prstGeom>
-          <a:ln w="76200">
-            <a:solidFill>
-              <a:schemeClr val="accent3"/>
-            </a:solidFill>
-            <a:tailEnd type="triangle"/>
-          </a:ln>
-        </p:spPr>
-        <p:style>
-          <a:lnRef idx="1">
-            <a:schemeClr val="accent1"/>
-          </a:lnRef>
-          <a:fillRef idx="0">
-            <a:schemeClr val="accent1"/>
-          </a:fillRef>
-          <a:effectRef idx="0">
-            <a:schemeClr val="accent1"/>
-          </a:effectRef>
-          <a:fontRef idx="minor">
-            <a:schemeClr val="tx1"/>
-          </a:fontRef>
-        </p:style>
-      </p:cxnSp>
-      <p:sp>
-        <p:nvSpPr>
-          <p:cNvPr id="20" name="TextBox 19">
-            <a:extLst>
-              <a:ext uri="{FF2B5EF4-FFF2-40B4-BE49-F238E27FC236}">
-                <a16:creationId xmlns:a16="http://schemas.microsoft.com/office/drawing/2014/main" id="{5BE8265E-FCB7-0290-9EC3-FA75097DE770}"/>
-              </a:ext>
-            </a:extLst>
-          </p:cNvPr>
-          <p:cNvSpPr txBox="1"/>
-          <p:nvPr/>
-        </p:nvSpPr>
-        <p:spPr>
-          <a:xfrm rot="19192747">
-            <a:off x="7669910" y="4478131"/>
-            <a:ext cx="748923" cy="400110"/>
-          </a:xfrm>
-          <a:prstGeom prst="rect">
-            <a:avLst/>
-          </a:prstGeom>
-          <a:noFill/>
-        </p:spPr>
-        <p:txBody>
-          <a:bodyPr wrap="none" rtlCol="0">
-            <a:spAutoFit/>
-          </a:bodyPr>
-          <a:lstStyle/>
-          <a:p>
-            <a:r>
-              <a:rPr lang="en-CA" sz="2000" dirty="0">
-                <a:solidFill>
-                  <a:schemeClr val="tx1">
-                    <a:lumMod val="75000"/>
-                    <a:lumOff val="25000"/>
-                  </a:schemeClr>
-                </a:solidFill>
-              </a:rPr>
-              <a:t>Push</a:t>
-            </a:r>
-          </a:p>
-        </p:txBody>
-      </p:sp>
-      <p:cxnSp>
-        <p:nvCxnSpPr>
-          <p:cNvPr id="21" name="Straight Arrow Connector 20">
-            <a:extLst>
-              <a:ext uri="{FF2B5EF4-FFF2-40B4-BE49-F238E27FC236}">
-                <a16:creationId xmlns:a16="http://schemas.microsoft.com/office/drawing/2014/main" id="{2795C08C-41D1-CEE0-DFB7-43FC8DB37EFB}"/>
-              </a:ext>
-            </a:extLst>
-          </p:cNvPr>
-          <p:cNvCxnSpPr>
-            <a:cxnSpLocks/>
-          </p:cNvCxnSpPr>
-          <p:nvPr/>
-        </p:nvCxnSpPr>
-        <p:spPr>
-          <a:xfrm>
-            <a:off x="4543854" y="3355242"/>
-            <a:ext cx="3085255" cy="0"/>
-          </a:xfrm>
-          <a:prstGeom prst="straightConnector1">
-            <a:avLst/>
-          </a:prstGeom>
-          <a:ln w="76200">
-            <a:solidFill>
-              <a:schemeClr val="accent3"/>
-            </a:solidFill>
-            <a:tailEnd type="triangle"/>
-          </a:ln>
-        </p:spPr>
-        <p:style>
-          <a:lnRef idx="1">
-            <a:schemeClr val="accent1"/>
-          </a:lnRef>
-          <a:fillRef idx="0">
-            <a:schemeClr val="accent1"/>
-          </a:fillRef>
-          <a:effectRef idx="0">
-            <a:schemeClr val="accent1"/>
-          </a:effectRef>
-          <a:fontRef idx="minor">
-            <a:schemeClr val="tx1"/>
-          </a:fontRef>
-        </p:style>
-      </p:cxnSp>
-      <p:sp>
-        <p:nvSpPr>
-          <p:cNvPr id="23" name="TextBox 22">
-            <a:extLst>
-              <a:ext uri="{FF2B5EF4-FFF2-40B4-BE49-F238E27FC236}">
-                <a16:creationId xmlns:a16="http://schemas.microsoft.com/office/drawing/2014/main" id="{593175FC-D5AA-7EAE-9732-E0882A07F5DE}"/>
-              </a:ext>
-            </a:extLst>
-          </p:cNvPr>
-          <p:cNvSpPr txBox="1"/>
-          <p:nvPr/>
-        </p:nvSpPr>
-        <p:spPr>
-          <a:xfrm>
-            <a:off x="5744881" y="2887177"/>
-            <a:ext cx="683200" cy="400110"/>
-          </a:xfrm>
-          <a:prstGeom prst="rect">
-            <a:avLst/>
-          </a:prstGeom>
-          <a:noFill/>
-        </p:spPr>
-        <p:txBody>
-          <a:bodyPr wrap="none" rtlCol="0">
-            <a:spAutoFit/>
-          </a:bodyPr>
-          <a:lstStyle/>
-          <a:p>
-            <a:r>
-              <a:rPr lang="en-CA" sz="2000" dirty="0">
-                <a:solidFill>
-                  <a:schemeClr val="tx1">
-                    <a:lumMod val="75000"/>
-                    <a:lumOff val="25000"/>
-                  </a:schemeClr>
-                </a:solidFill>
-              </a:rPr>
-              <a:t>Fork</a:t>
-            </a:r>
-          </a:p>
-        </p:txBody>
-      </p:sp>
-      <p:sp>
-        <p:nvSpPr>
-          <p:cNvPr id="14" name="TextBox 13">
-            <a:extLst>
-              <a:ext uri="{FF2B5EF4-FFF2-40B4-BE49-F238E27FC236}">
-                <a16:creationId xmlns:a16="http://schemas.microsoft.com/office/drawing/2014/main" id="{7A349DF9-05C6-F709-F6C5-106FA7C5E894}"/>
-              </a:ext>
-            </a:extLst>
-          </p:cNvPr>
-          <p:cNvSpPr txBox="1"/>
-          <p:nvPr/>
-        </p:nvSpPr>
-        <p:spPr>
-          <a:xfrm rot="2645474">
-            <a:off x="2871195" y="5030735"/>
-            <a:ext cx="595035" cy="400110"/>
-          </a:xfrm>
-          <a:prstGeom prst="rect">
-            <a:avLst/>
-          </a:prstGeom>
-          <a:noFill/>
-        </p:spPr>
-        <p:txBody>
-          <a:bodyPr wrap="none" rtlCol="0">
-            <a:spAutoFit/>
-          </a:bodyPr>
-          <a:lstStyle/>
-          <a:p>
-            <a:r>
-              <a:rPr lang="en-CA" sz="2000" dirty="0">
-                <a:solidFill>
-                  <a:schemeClr val="tx1">
-                    <a:lumMod val="75000"/>
-                    <a:lumOff val="25000"/>
-                  </a:schemeClr>
-                </a:solidFill>
-              </a:rPr>
-              <a:t>Pull</a:t>
-            </a:r>
+              <a:t>will attempt to overwrite your changes every time!</a:t>
+            </a:r>
+            <a:endParaRPr lang="en-CA" sz="2000" dirty="0">
+              <a:cs typeface="Courier New" panose="02070309020205020404" pitchFamily="49" charset="0"/>
+            </a:endParaRPr>
           </a:p>
         </p:txBody>
       </p:sp>
     </p:spTree>
     <p:extLst>
       <p:ext uri="{BB962C8B-B14F-4D97-AF65-F5344CB8AC3E}">
-        <p14:creationId xmlns:p14="http://schemas.microsoft.com/office/powerpoint/2010/main" val="824081583"/>
+        <p14:creationId xmlns:p14="http://schemas.microsoft.com/office/powerpoint/2010/main" val="2744339177"/>
       </p:ext>
     </p:extLst>
   </p:cSld>
   <p:clrMapOvr>
     <a:masterClrMapping/>
   </p:clrMapOvr>
-  <p:timing>
-    <p:tnLst>
-      <p:par>
-        <p:cTn id="1" dur="indefinite" restart="never" nodeType="tmRoot">
-          <p:childTnLst>
-            <p:seq concurrent="1" nextAc="seek">
-              <p:cTn id="2" dur="indefinite" nodeType="mainSeq">
-                <p:childTnLst>
-                  <p:par>
-                    <p:cTn id="3" fill="hold">
-                      <p:stCondLst>
-                        <p:cond delay="indefinite"/>
-                      </p:stCondLst>
-                      <p:childTnLst>
-                        <p:par>
-                          <p:cTn id="4" fill="hold">
-                            <p:stCondLst>
-                              <p:cond delay="0"/>
-                            </p:stCondLst>
-                            <p:childTnLst>
-                              <p:par>
-                                <p:cTn id="5" presetID="10" presetClass="entr" presetSubtype="0" fill="hold" nodeType="clickEffect">
-                                  <p:stCondLst>
-                                    <p:cond delay="0"/>
-                                  </p:stCondLst>
-                                  <p:childTnLst>
-                                    <p:set>
-                                      <p:cBhvr>
-                                        <p:cTn id="6" dur="1" fill="hold">
-                                          <p:stCondLst>
-                                            <p:cond delay="0"/>
-                                          </p:stCondLst>
-                                        </p:cTn>
-                                        <p:tgtEl>
-                                          <p:spTgt spid="10"/>
-                                        </p:tgtEl>
-                                        <p:attrNameLst>
-                                          <p:attrName>style.visibility</p:attrName>
-                                        </p:attrNameLst>
-                                      </p:cBhvr>
-                                      <p:to>
-                                        <p:strVal val="visible"/>
-                                      </p:to>
-                                    </p:set>
-                                    <p:animEffect transition="in" filter="fade">
-                                      <p:cBhvr>
-                                        <p:cTn id="7" dur="500"/>
-                                        <p:tgtEl>
-                                          <p:spTgt spid="10"/>
-                                        </p:tgtEl>
-                                      </p:cBhvr>
-                                    </p:animEffect>
-                                  </p:childTnLst>
-                                </p:cTn>
-                              </p:par>
-                              <p:par>
-                                <p:cTn id="8" presetID="10" presetClass="entr" presetSubtype="0" fill="hold" grpId="0" nodeType="withEffect">
-                                  <p:stCondLst>
-                                    <p:cond delay="0"/>
-                                  </p:stCondLst>
-                                  <p:childTnLst>
-                                    <p:set>
-                                      <p:cBhvr>
-                                        <p:cTn id="9" dur="1" fill="hold">
-                                          <p:stCondLst>
-                                            <p:cond delay="0"/>
-                                          </p:stCondLst>
-                                        </p:cTn>
-                                        <p:tgtEl>
-                                          <p:spTgt spid="11"/>
-                                        </p:tgtEl>
-                                        <p:attrNameLst>
-                                          <p:attrName>style.visibility</p:attrName>
-                                        </p:attrNameLst>
-                                      </p:cBhvr>
-                                      <p:to>
-                                        <p:strVal val="visible"/>
-                                      </p:to>
-                                    </p:set>
-                                    <p:animEffect transition="in" filter="fade">
-                                      <p:cBhvr>
-                                        <p:cTn id="10" dur="500"/>
-                                        <p:tgtEl>
-                                          <p:spTgt spid="11"/>
-                                        </p:tgtEl>
-                                      </p:cBhvr>
-                                    </p:animEffect>
-                                  </p:childTnLst>
-                                </p:cTn>
-                              </p:par>
-                              <p:par>
-                                <p:cTn id="11" presetID="10" presetClass="entr" presetSubtype="0" fill="hold" grpId="0" nodeType="withEffect">
-                                  <p:stCondLst>
-                                    <p:cond delay="0"/>
-                                  </p:stCondLst>
-                                  <p:childTnLst>
-                                    <p:set>
-                                      <p:cBhvr>
-                                        <p:cTn id="12" dur="1" fill="hold">
-                                          <p:stCondLst>
-                                            <p:cond delay="0"/>
-                                          </p:stCondLst>
-                                        </p:cTn>
-                                        <p:tgtEl>
-                                          <p:spTgt spid="8"/>
-                                        </p:tgtEl>
-                                        <p:attrNameLst>
-                                          <p:attrName>style.visibility</p:attrName>
-                                        </p:attrNameLst>
-                                      </p:cBhvr>
-                                      <p:to>
-                                        <p:strVal val="visible"/>
-                                      </p:to>
-                                    </p:set>
-                                    <p:animEffect transition="in" filter="fade">
-                                      <p:cBhvr>
-                                        <p:cTn id="13" dur="500"/>
-                                        <p:tgtEl>
-                                          <p:spTgt spid="8"/>
-                                        </p:tgtEl>
-                                      </p:cBhvr>
-                                    </p:animEffect>
-                                  </p:childTnLst>
-                                </p:cTn>
-                              </p:par>
-                              <p:par>
-                                <p:cTn id="14" presetID="10" presetClass="entr" presetSubtype="0" fill="hold" grpId="0" nodeType="withEffect">
-                                  <p:stCondLst>
-                                    <p:cond delay="0"/>
-                                  </p:stCondLst>
-                                  <p:childTnLst>
-                                    <p:set>
-                                      <p:cBhvr>
-                                        <p:cTn id="15" dur="1" fill="hold">
-                                          <p:stCondLst>
-                                            <p:cond delay="0"/>
-                                          </p:stCondLst>
-                                        </p:cTn>
-                                        <p:tgtEl>
-                                          <p:spTgt spid="20"/>
-                                        </p:tgtEl>
-                                        <p:attrNameLst>
-                                          <p:attrName>style.visibility</p:attrName>
-                                        </p:attrNameLst>
-                                      </p:cBhvr>
-                                      <p:to>
-                                        <p:strVal val="visible"/>
-                                      </p:to>
-                                    </p:set>
-                                    <p:animEffect transition="in" filter="fade">
-                                      <p:cBhvr>
-                                        <p:cTn id="16" dur="500"/>
-                                        <p:tgtEl>
-                                          <p:spTgt spid="20"/>
-                                        </p:tgtEl>
-                                      </p:cBhvr>
-                                    </p:animEffect>
-                                  </p:childTnLst>
-                                </p:cTn>
-                              </p:par>
-                              <p:par>
-                                <p:cTn id="17" presetID="10" presetClass="entr" presetSubtype="0" fill="hold" nodeType="withEffect">
-                                  <p:stCondLst>
-                                    <p:cond delay="0"/>
-                                  </p:stCondLst>
-                                  <p:childTnLst>
-                                    <p:set>
-                                      <p:cBhvr>
-                                        <p:cTn id="18" dur="1" fill="hold">
-                                          <p:stCondLst>
-                                            <p:cond delay="0"/>
-                                          </p:stCondLst>
-                                        </p:cTn>
-                                        <p:tgtEl>
-                                          <p:spTgt spid="17"/>
-                                        </p:tgtEl>
-                                        <p:attrNameLst>
-                                          <p:attrName>style.visibility</p:attrName>
-                                        </p:attrNameLst>
-                                      </p:cBhvr>
-                                      <p:to>
-                                        <p:strVal val="visible"/>
-                                      </p:to>
-                                    </p:set>
-                                    <p:animEffect transition="in" filter="fade">
-                                      <p:cBhvr>
-                                        <p:cTn id="19" dur="500"/>
-                                        <p:tgtEl>
-                                          <p:spTgt spid="17"/>
-                                        </p:tgtEl>
-                                      </p:cBhvr>
-                                    </p:animEffect>
-                                  </p:childTnLst>
-                                </p:cTn>
-                              </p:par>
-                              <p:par>
-                                <p:cTn id="20" presetID="10" presetClass="entr" presetSubtype="0" fill="hold" nodeType="withEffect">
-                                  <p:stCondLst>
-                                    <p:cond delay="0"/>
-                                  </p:stCondLst>
-                                  <p:childTnLst>
-                                    <p:set>
-                                      <p:cBhvr>
-                                        <p:cTn id="21" dur="1" fill="hold">
-                                          <p:stCondLst>
-                                            <p:cond delay="0"/>
-                                          </p:stCondLst>
-                                        </p:cTn>
-                                        <p:tgtEl>
-                                          <p:spTgt spid="12"/>
-                                        </p:tgtEl>
-                                        <p:attrNameLst>
-                                          <p:attrName>style.visibility</p:attrName>
-                                        </p:attrNameLst>
-                                      </p:cBhvr>
-                                      <p:to>
-                                        <p:strVal val="visible"/>
-                                      </p:to>
-                                    </p:set>
-                                    <p:animEffect transition="in" filter="fade">
-                                      <p:cBhvr>
-                                        <p:cTn id="22" dur="500"/>
-                                        <p:tgtEl>
-                                          <p:spTgt spid="12"/>
-                                        </p:tgtEl>
-                                      </p:cBhvr>
-                                    </p:animEffect>
-                                  </p:childTnLst>
-                                </p:cTn>
-                              </p:par>
-                              <p:par>
-                                <p:cTn id="23" presetID="10" presetClass="entr" presetSubtype="0" fill="hold" grpId="0" nodeType="withEffect">
-                                  <p:stCondLst>
-                                    <p:cond delay="0"/>
-                                  </p:stCondLst>
-                                  <p:childTnLst>
-                                    <p:set>
-                                      <p:cBhvr>
-                                        <p:cTn id="24" dur="1" fill="hold">
-                                          <p:stCondLst>
-                                            <p:cond delay="0"/>
-                                          </p:stCondLst>
-                                        </p:cTn>
-                                        <p:tgtEl>
-                                          <p:spTgt spid="16"/>
-                                        </p:tgtEl>
-                                        <p:attrNameLst>
-                                          <p:attrName>style.visibility</p:attrName>
-                                        </p:attrNameLst>
-                                      </p:cBhvr>
-                                      <p:to>
-                                        <p:strVal val="visible"/>
-                                      </p:to>
-                                    </p:set>
-                                    <p:animEffect transition="in" filter="fade">
-                                      <p:cBhvr>
-                                        <p:cTn id="25" dur="500"/>
-                                        <p:tgtEl>
-                                          <p:spTgt spid="16"/>
-                                        </p:tgtEl>
-                                      </p:cBhvr>
-                                    </p:animEffect>
-                                  </p:childTnLst>
-                                </p:cTn>
-                              </p:par>
-                              <p:par>
-                                <p:cTn id="26" presetID="10" presetClass="entr" presetSubtype="0" fill="hold" grpId="0" nodeType="withEffect">
-                                  <p:stCondLst>
-                                    <p:cond delay="0"/>
-                                  </p:stCondLst>
-                                  <p:childTnLst>
-                                    <p:set>
-                                      <p:cBhvr>
-                                        <p:cTn id="27" dur="1" fill="hold">
-                                          <p:stCondLst>
-                                            <p:cond delay="0"/>
-                                          </p:stCondLst>
-                                        </p:cTn>
-                                        <p:tgtEl>
-                                          <p:spTgt spid="14"/>
-                                        </p:tgtEl>
-                                        <p:attrNameLst>
-                                          <p:attrName>style.visibility</p:attrName>
-                                        </p:attrNameLst>
-                                      </p:cBhvr>
-                                      <p:to>
-                                        <p:strVal val="visible"/>
-                                      </p:to>
-                                    </p:set>
-                                    <p:animEffect transition="in" filter="fade">
-                                      <p:cBhvr>
-                                        <p:cTn id="28" dur="500"/>
-                                        <p:tgtEl>
-                                          <p:spTgt spid="14"/>
-                                        </p:tgtEl>
-                                      </p:cBhvr>
-                                    </p:animEffect>
-                                  </p:childTnLst>
-                                </p:cTn>
-                              </p:par>
-                            </p:childTnLst>
-                          </p:cTn>
-                        </p:par>
-                      </p:childTnLst>
-                    </p:cTn>
-                  </p:par>
-                </p:childTnLst>
-              </p:cTn>
-              <p:prevCondLst>
-                <p:cond evt="onPrev" delay="0">
-                  <p:tgtEl>
-                    <p:sldTgt/>
-                  </p:tgtEl>
-                </p:cond>
-              </p:prevCondLst>
-              <p:nextCondLst>
-                <p:cond evt="onNext" delay="0">
-                  <p:tgtEl>
-                    <p:sldTgt/>
-                  </p:tgtEl>
-                </p:cond>
-              </p:nextCondLst>
-            </p:seq>
-          </p:childTnLst>
-        </p:cTn>
-      </p:par>
-    </p:tnLst>
-    <p:bldLst>
-      <p:bldP spid="8" grpId="0" animBg="1"/>
-      <p:bldP spid="11" grpId="0"/>
-      <p:bldP spid="16" grpId="0"/>
-      <p:bldP spid="20" grpId="0"/>
-      <p:bldP spid="14" grpId="0"/>
-    </p:bldLst>
-  </p:timing>
 </p:sld>
 </file>
 
@@ -26180,7 +25352,7 @@
           <p:cNvPr id="2" name="Title 1">
             <a:extLst>
               <a:ext uri="{FF2B5EF4-FFF2-40B4-BE49-F238E27FC236}">
-                <a16:creationId xmlns:a16="http://schemas.microsoft.com/office/drawing/2014/main" id="{4D45FFC6-0FA8-7C6D-E6AF-6F25A2B948EB}"/>
+                <a16:creationId xmlns:a16="http://schemas.microsoft.com/office/drawing/2014/main" id="{86B58B30-FF9E-A389-D935-AFB0B63BA0F5}"/>
               </a:ext>
             </a:extLst>
           </p:cNvPr>
@@ -26198,7 +25370,7 @@
           <a:p>
             <a:r>
               <a:rPr lang="en-CA" dirty="0"/>
-              <a:t>Saving our changes</a:t>
+              <a:t>“Pushing” local changes to remote</a:t>
             </a:r>
           </a:p>
         </p:txBody>
@@ -26208,7 +25380,7 @@
           <p:cNvPr id="3" name="Content Placeholder 2">
             <a:extLst>
               <a:ext uri="{FF2B5EF4-FFF2-40B4-BE49-F238E27FC236}">
-                <a16:creationId xmlns:a16="http://schemas.microsoft.com/office/drawing/2014/main" id="{492DEBB2-8607-C779-0D71-D2D0DA052D17}"/>
+                <a16:creationId xmlns:a16="http://schemas.microsoft.com/office/drawing/2014/main" id="{DB74DE89-2191-DBE5-4F7E-5A64B17F1765}"/>
               </a:ext>
             </a:extLst>
           </p:cNvPr>
@@ -26221,8 +25393,8 @@
         </p:nvSpPr>
         <p:spPr>
           <a:xfrm>
-            <a:off x="505485" y="2241360"/>
-            <a:ext cx="11181029" cy="4616640"/>
+            <a:off x="482851" y="2335794"/>
+            <a:ext cx="11494884" cy="4599160"/>
           </a:xfrm>
         </p:spPr>
         <p:txBody>
@@ -26233,83 +25405,140 @@
           <a:p>
             <a:r>
               <a:rPr lang="en-CA" dirty="0"/>
-              <a:t>After a hard day’s work, we want to commit the changes we made to the code</a:t>
+              <a:t>After modifying the code locally, you will want to push it to your remote GitHub repo</a:t>
             </a:r>
           </a:p>
           <a:p>
             <a:r>
               <a:rPr lang="en-CA" dirty="0"/>
-              <a:t>As before, we’ll follow these steps:</a:t>
+              <a:t>This is done via the following steps:</a:t>
             </a:r>
           </a:p>
           <a:p>
             <a:pPr lvl="1"/>
             <a:r>
+              <a:rPr lang="en-CA" sz="1600" dirty="0"/>
+              <a:t>Open up your file explorer and navigate to your local Intro-to-Python folder</a:t>
+            </a:r>
+          </a:p>
+          <a:p>
+            <a:pPr lvl="1"/>
+            <a:r>
+              <a:rPr lang="en-CA" sz="1600" dirty="0"/>
+              <a:t>Right click and select “Git Bash Here”</a:t>
+            </a:r>
+          </a:p>
+          <a:p>
+            <a:pPr lvl="1"/>
+            <a:r>
+              <a:rPr lang="en-CA" sz="1600" dirty="0"/>
+              <a:t>Type in the following (hitting enter after each line):</a:t>
+            </a:r>
+          </a:p>
+          <a:p>
+            <a:pPr lvl="2">
+              <a:buSzPct val="120000"/>
+              <a:buFont typeface="Courier New" panose="02070309020205020404" pitchFamily="49" charset="0"/>
+              <a:buChar char="$"/>
+            </a:pPr>
+            <a:r>
+              <a:rPr lang="en-CA" dirty="0">
+                <a:latin typeface="Courier New" panose="02070309020205020404" pitchFamily="49" charset="0"/>
+                <a:cs typeface="Courier New" panose="02070309020205020404" pitchFamily="49" charset="0"/>
+              </a:rPr>
+              <a:t>git status</a:t>
+            </a:r>
+          </a:p>
+          <a:p>
+            <a:pPr lvl="2">
+              <a:buSzPct val="120000"/>
+              <a:buFont typeface="Courier New" panose="02070309020205020404" pitchFamily="49" charset="0"/>
+              <a:buChar char="$"/>
+            </a:pPr>
+            <a:r>
+              <a:rPr lang="en-CA" dirty="0">
+                <a:latin typeface="Courier New" panose="02070309020205020404" pitchFamily="49" charset="0"/>
+                <a:cs typeface="Courier New" panose="02070309020205020404" pitchFamily="49" charset="0"/>
+              </a:rPr>
+              <a:t>git add &lt;modified files&gt;</a:t>
+            </a:r>
+          </a:p>
+          <a:p>
+            <a:pPr lvl="2">
+              <a:buSzPct val="120000"/>
+              <a:buFont typeface="Courier New" panose="02070309020205020404" pitchFamily="49" charset="0"/>
+              <a:buChar char="$"/>
+            </a:pPr>
+            <a:r>
+              <a:rPr lang="en-CA" dirty="0">
+                <a:latin typeface="Courier New" panose="02070309020205020404" pitchFamily="49" charset="0"/>
+                <a:cs typeface="Courier New" panose="02070309020205020404" pitchFamily="49" charset="0"/>
+              </a:rPr>
+              <a:t>git commit –m “commit message”</a:t>
+            </a:r>
+          </a:p>
+          <a:p>
+            <a:pPr lvl="2">
+              <a:buSzPct val="120000"/>
+              <a:buFont typeface="Courier New" panose="02070309020205020404" pitchFamily="49" charset="0"/>
+              <a:buChar char="$"/>
+            </a:pPr>
+            <a:r>
+              <a:rPr lang="en-CA" dirty="0">
+                <a:latin typeface="Courier New" panose="02070309020205020404" pitchFamily="49" charset="0"/>
+                <a:cs typeface="Courier New" panose="02070309020205020404" pitchFamily="49" charset="0"/>
+              </a:rPr>
+              <a:t>git push origin main</a:t>
+            </a:r>
+          </a:p>
+          <a:p>
+            <a:pPr lvl="1"/>
+            <a:r>
               <a:rPr lang="en-CA" dirty="0"/>
-              <a:t>Open up your file explorer and navigate to your local Intro-to-Python folder</a:t>
+              <a:t>Replace </a:t>
+            </a:r>
+            <a:r>
+              <a:rPr lang="en-CA" dirty="0">
+                <a:latin typeface="Courier New" panose="02070309020205020404" pitchFamily="49" charset="0"/>
+                <a:cs typeface="Courier New" panose="02070309020205020404" pitchFamily="49" charset="0"/>
+              </a:rPr>
+              <a:t>&lt;modified files&gt; </a:t>
+            </a:r>
+            <a:r>
+              <a:rPr lang="en-CA" dirty="0"/>
+              <a:t>by the files you changed</a:t>
+            </a:r>
+          </a:p>
+          <a:p>
+            <a:pPr lvl="2"/>
+            <a:r>
+              <a:rPr lang="en-CA" dirty="0">
+                <a:latin typeface="Courier New" panose="02070309020205020404" pitchFamily="49" charset="0"/>
+                <a:cs typeface="Courier New" panose="02070309020205020404" pitchFamily="49" charset="0"/>
+              </a:rPr>
+              <a:t>git status </a:t>
+            </a:r>
+            <a:r>
+              <a:rPr lang="en-CA" dirty="0"/>
+              <a:t>allows you to see all modified files</a:t>
             </a:r>
           </a:p>
           <a:p>
             <a:pPr lvl="1"/>
             <a:r>
               <a:rPr lang="en-CA" dirty="0"/>
-              <a:t>Right click and select “Git Bash Here”</a:t>
-            </a:r>
-          </a:p>
-          <a:p>
-            <a:pPr lvl="1"/>
+              <a:t>Replace </a:t>
+            </a:r>
+            <a:r>
+              <a:rPr lang="en-CA" dirty="0">
+                <a:latin typeface="Courier New" panose="02070309020205020404" pitchFamily="49" charset="0"/>
+                <a:cs typeface="Courier New" panose="02070309020205020404" pitchFamily="49" charset="0"/>
+              </a:rPr>
+              <a:t>“commit message” </a:t>
+            </a:r>
             <a:r>
               <a:rPr lang="en-CA" dirty="0"/>
-              <a:t>Type in the following:</a:t>
-            </a:r>
-          </a:p>
-          <a:p>
-            <a:pPr lvl="2"/>
-            <a:r>
-              <a:rPr lang="en-CA" dirty="0"/>
-              <a:t>git status</a:t>
-            </a:r>
-          </a:p>
-          <a:p>
-            <a:pPr lvl="2"/>
-            <a:r>
-              <a:rPr lang="en-CA" dirty="0"/>
-              <a:t>git add &lt;changed files&gt;</a:t>
-            </a:r>
-          </a:p>
-          <a:p>
-            <a:pPr lvl="2"/>
-            <a:r>
-              <a:rPr lang="en-CA" dirty="0"/>
-              <a:t>git commit –m “commit message”</a:t>
-            </a:r>
-          </a:p>
-          <a:p>
-            <a:pPr lvl="2"/>
-            <a:r>
-              <a:rPr lang="en-CA" dirty="0"/>
-              <a:t>git push origin main</a:t>
-            </a:r>
-          </a:p>
-          <a:p>
-            <a:pPr lvl="1"/>
-            <a:r>
-              <a:rPr lang="en-CA" dirty="0"/>
-              <a:t>Make sure to replace &lt;changed files&gt; with the names of the files you modify</a:t>
-            </a:r>
-          </a:p>
-          <a:p>
-            <a:pPr lvl="2"/>
-            <a:r>
-              <a:rPr lang="en-CA" dirty="0"/>
-              <a:t>git status allows you to see the names of the modified files</a:t>
-            </a:r>
-          </a:p>
-          <a:p>
-            <a:pPr lvl="1"/>
-            <a:r>
-              <a:rPr lang="en-CA" dirty="0"/>
-              <a:t>And replace “commit message” with a meaningful commit message describing the changes you made</a:t>
+              <a:t>with a meaningful commit message</a:t>
             </a:r>
           </a:p>
         </p:txBody>
@@ -26317,7 +25546,161 @@
     </p:spTree>
     <p:extLst>
       <p:ext uri="{BB962C8B-B14F-4D97-AF65-F5344CB8AC3E}">
-        <p14:creationId xmlns:p14="http://schemas.microsoft.com/office/powerpoint/2010/main" val="298430878"/>
+        <p14:creationId xmlns:p14="http://schemas.microsoft.com/office/powerpoint/2010/main" val="134378743"/>
+      </p:ext>
+    </p:extLst>
+  </p:cSld>
+  <p:clrMapOvr>
+    <a:masterClrMapping/>
+  </p:clrMapOvr>
+</p:sld>
+</file>
+
+<file path=ppt/slides/slide36.xml><?xml version="1.0" encoding="utf-8"?>
+<p:sld xmlns:a="http://schemas.openxmlformats.org/drawingml/2006/main" xmlns:r="http://schemas.openxmlformats.org/officeDocument/2006/relationships" xmlns:p="http://schemas.openxmlformats.org/presentationml/2006/main">
+  <p:cSld>
+    <p:spTree>
+      <p:nvGrpSpPr>
+        <p:cNvPr id="1" name=""/>
+        <p:cNvGrpSpPr/>
+        <p:nvPr/>
+      </p:nvGrpSpPr>
+      <p:grpSpPr>
+        <a:xfrm>
+          <a:off x="0" y="0"/>
+          <a:ext cx="0" cy="0"/>
+          <a:chOff x="0" y="0"/>
+          <a:chExt cx="0" cy="0"/>
+        </a:xfrm>
+      </p:grpSpPr>
+      <p:sp>
+        <p:nvSpPr>
+          <p:cNvPr id="2" name="Title 1">
+            <a:extLst>
+              <a:ext uri="{FF2B5EF4-FFF2-40B4-BE49-F238E27FC236}">
+                <a16:creationId xmlns:a16="http://schemas.microsoft.com/office/drawing/2014/main" id="{F8A923FB-40CA-9A8A-6B22-02F2284C75DB}"/>
+              </a:ext>
+            </a:extLst>
+          </p:cNvPr>
+          <p:cNvSpPr>
+            <a:spLocks noGrp="1"/>
+          </p:cNvSpPr>
+          <p:nvPr>
+            <p:ph type="title"/>
+          </p:nvPr>
+        </p:nvSpPr>
+        <p:spPr/>
+        <p:txBody>
+          <a:bodyPr/>
+          <a:lstStyle/>
+          <a:p>
+            <a:r>
+              <a:rPr lang="en-CA" dirty="0"/>
+              <a:t>Git push breakdown</a:t>
+            </a:r>
+          </a:p>
+        </p:txBody>
+      </p:sp>
+      <p:sp>
+        <p:nvSpPr>
+          <p:cNvPr id="3" name="Content Placeholder 2">
+            <a:extLst>
+              <a:ext uri="{FF2B5EF4-FFF2-40B4-BE49-F238E27FC236}">
+                <a16:creationId xmlns:a16="http://schemas.microsoft.com/office/drawing/2014/main" id="{4598FED0-95E7-F178-B8FA-7104754FBDEA}"/>
+              </a:ext>
+            </a:extLst>
+          </p:cNvPr>
+          <p:cNvSpPr>
+            <a:spLocks noGrp="1"/>
+          </p:cNvSpPr>
+          <p:nvPr>
+            <p:ph idx="1"/>
+          </p:nvPr>
+        </p:nvSpPr>
+        <p:spPr>
+          <a:xfrm>
+            <a:off x="564333" y="2340321"/>
+            <a:ext cx="11063334" cy="4517679"/>
+          </a:xfrm>
+        </p:spPr>
+        <p:txBody>
+          <a:bodyPr>
+            <a:normAutofit/>
+          </a:bodyPr>
+          <a:lstStyle/>
+          <a:p>
+            <a:r>
+              <a:rPr lang="en-CA" sz="2000" dirty="0"/>
+              <a:t>Add:</a:t>
+            </a:r>
+          </a:p>
+          <a:p>
+            <a:pPr lvl="1"/>
+            <a:r>
+              <a:rPr lang="en-CA" sz="1800" dirty="0"/>
+              <a:t>Specifies which files to add to the commit</a:t>
+            </a:r>
+          </a:p>
+          <a:p>
+            <a:pPr lvl="1"/>
+            <a:r>
+              <a:rPr lang="en-CA" sz="1800" dirty="0"/>
+              <a:t>Lets you purposely omit files you do not wish to commit</a:t>
+            </a:r>
+          </a:p>
+          <a:p>
+            <a:r>
+              <a:rPr lang="en-CA" sz="2000" dirty="0"/>
+              <a:t>Commit:</a:t>
+            </a:r>
+          </a:p>
+          <a:p>
+            <a:pPr lvl="1"/>
+            <a:r>
+              <a:rPr lang="en-CA" sz="1800" dirty="0"/>
+              <a:t>It’s in the name: you are “committed” to the changes you made</a:t>
+            </a:r>
+          </a:p>
+          <a:p>
+            <a:pPr lvl="1"/>
+            <a:r>
+              <a:rPr lang="en-CA" sz="1800" dirty="0"/>
+              <a:t>Git commit saves a copy of your files at the moment of the commit</a:t>
+            </a:r>
+          </a:p>
+          <a:p>
+            <a:pPr lvl="1"/>
+            <a:r>
+              <a:rPr lang="en-CA" sz="1800" dirty="0"/>
+              <a:t>Allows you to return to previous versions if need be</a:t>
+            </a:r>
+          </a:p>
+          <a:p>
+            <a:r>
+              <a:rPr lang="en-CA" sz="2000" dirty="0"/>
+              <a:t>Push:</a:t>
+            </a:r>
+          </a:p>
+          <a:p>
+            <a:pPr lvl="1"/>
+            <a:r>
+              <a:rPr lang="en-CA" sz="1800" dirty="0"/>
+              <a:t>Pushes the committed files to the remote directory</a:t>
+            </a:r>
+          </a:p>
+          <a:p>
+            <a:pPr lvl="1"/>
+            <a:r>
+              <a:rPr lang="en-CA" sz="1800" dirty="0"/>
+              <a:t>Now, if you log into GitHub in the browser, you will see the modified files appearing in your repo!</a:t>
+            </a:r>
+          </a:p>
+        </p:txBody>
+      </p:sp>
+    </p:spTree>
+    <p:extLst>
+      <p:ext uri="{BB962C8B-B14F-4D97-AF65-F5344CB8AC3E}">
+        <p14:creationId xmlns:p14="http://schemas.microsoft.com/office/powerpoint/2010/main" val="3040405518"/>
       </p:ext>
     </p:extLst>
   </p:cSld>
@@ -27799,7 +27182,7 @@
           <p:cNvPr id="2" name="Title 1">
             <a:extLst>
               <a:ext uri="{FF2B5EF4-FFF2-40B4-BE49-F238E27FC236}">
-                <a16:creationId xmlns:a16="http://schemas.microsoft.com/office/drawing/2014/main" id="{86B58B30-FF9E-A389-D935-AFB0B63BA0F5}"/>
+                <a16:creationId xmlns:a16="http://schemas.microsoft.com/office/drawing/2014/main" id="{4FB8D1F2-D454-14FA-761A-43711947AABF}"/>
               </a:ext>
             </a:extLst>
           </p:cNvPr>
@@ -27816,9 +27199,10 @@
           <a:lstStyle/>
           <a:p>
             <a:r>
-              <a:rPr lang="en-CA" dirty="0"/>
-              <a:t>“Pushing” local changes to remote</a:t>
-            </a:r>
+              <a:rPr lang="en-US" dirty="0"/>
+              <a:t>Pull Remote Changes Using Git</a:t>
+            </a:r>
+            <a:endParaRPr lang="en-CA" dirty="0"/>
           </a:p>
         </p:txBody>
       </p:sp>
@@ -27827,7 +27211,7 @@
           <p:cNvPr id="3" name="Content Placeholder 2">
             <a:extLst>
               <a:ext uri="{FF2B5EF4-FFF2-40B4-BE49-F238E27FC236}">
-                <a16:creationId xmlns:a16="http://schemas.microsoft.com/office/drawing/2014/main" id="{DB74DE89-2191-DBE5-4F7E-5A64B17F1765}"/>
+                <a16:creationId xmlns:a16="http://schemas.microsoft.com/office/drawing/2014/main" id="{C359DBF5-EBA9-4FA6-BD3C-A08979427A39}"/>
               </a:ext>
             </a:extLst>
           </p:cNvPr>
@@ -27840,8 +27224,8 @@
         </p:nvSpPr>
         <p:spPr>
           <a:xfrm>
-            <a:off x="482851" y="2335794"/>
-            <a:ext cx="11494884" cy="4599160"/>
+            <a:off x="387790" y="2218099"/>
+            <a:ext cx="11416419" cy="4639901"/>
           </a:xfrm>
         </p:spPr>
         <p:txBody>
@@ -27850,142 +27234,106 @@
           </a:bodyPr>
           <a:lstStyle/>
           <a:p>
-            <a:r>
-              <a:rPr lang="en-CA" dirty="0"/>
-              <a:t>After modifying the code locally, you will want to push it to your remote GitHub repo</a:t>
-            </a:r>
-          </a:p>
-          <a:p>
-            <a:r>
-              <a:rPr lang="en-CA" dirty="0"/>
-              <a:t>This is done via the following steps:</a:t>
-            </a:r>
-          </a:p>
-          <a:p>
-            <a:pPr lvl="1"/>
-            <a:r>
-              <a:rPr lang="en-CA" sz="1600" dirty="0"/>
-              <a:t>Open up your file explorer and navigate to your local Intro-to-Python folder</a:t>
-            </a:r>
-          </a:p>
-          <a:p>
-            <a:pPr lvl="1"/>
-            <a:r>
-              <a:rPr lang="en-CA" sz="1600" dirty="0"/>
-              <a:t>Right click and select “Git Bash Here”</a:t>
-            </a:r>
-          </a:p>
-          <a:p>
-            <a:pPr lvl="1"/>
-            <a:r>
-              <a:rPr lang="en-CA" sz="1600" dirty="0"/>
-              <a:t>Type in the following (hitting enter after each line):</a:t>
-            </a:r>
-          </a:p>
-          <a:p>
-            <a:pPr lvl="2">
+            <a:pPr>
+              <a:lnSpc>
+                <a:spcPct val="150000"/>
+              </a:lnSpc>
+            </a:pPr>
+            <a:r>
+              <a:rPr lang="en-CA" sz="2400" dirty="0"/>
+              <a:t>We need to “pull” changes from the instructor’s repository on GitHub to access latest version each week</a:t>
+            </a:r>
+          </a:p>
+          <a:p>
+            <a:pPr>
+              <a:lnSpc>
+                <a:spcPct val="150000"/>
+              </a:lnSpc>
+            </a:pPr>
+            <a:r>
+              <a:rPr lang="en-CA" sz="2400" dirty="0"/>
+              <a:t>Type the following commands in the Git Bash:</a:t>
+            </a:r>
+            <a:endParaRPr lang="en-CA" sz="2000" dirty="0"/>
+          </a:p>
+          <a:p>
+            <a:pPr lvl="1">
+              <a:lnSpc>
+                <a:spcPct val="150000"/>
+              </a:lnSpc>
               <a:buSzPct val="120000"/>
               <a:buFont typeface="Courier New" panose="02070309020205020404" pitchFamily="49" charset="0"/>
               <a:buChar char="$"/>
             </a:pPr>
             <a:r>
-              <a:rPr lang="en-CA" dirty="0">
+              <a:rPr lang="en-CA" sz="2000" dirty="0">
                 <a:latin typeface="Courier New" panose="02070309020205020404" pitchFamily="49" charset="0"/>
                 <a:cs typeface="Courier New" panose="02070309020205020404" pitchFamily="49" charset="0"/>
               </a:rPr>
-              <a:t>git status</a:t>
-            </a:r>
-          </a:p>
-          <a:p>
-            <a:pPr lvl="2">
+              <a:t>git remote add upstream </a:t>
+            </a:r>
+            <a:r>
+              <a:rPr lang="en-CA" sz="2000" dirty="0">
+                <a:latin typeface="Courier New" panose="02070309020205020404" pitchFamily="49" charset="0"/>
+                <a:cs typeface="Courier New" panose="02070309020205020404" pitchFamily="49" charset="0"/>
+                <a:hlinkClick r:id="rId2"/>
+              </a:rPr>
+              <a:t>https://github.com/baron-de-montrouge/Intro-to-Python.git</a:t>
+            </a:r>
+            <a:endParaRPr lang="en-CA" sz="2000" dirty="0">
+              <a:latin typeface="Courier New" panose="02070309020205020404" pitchFamily="49" charset="0"/>
+              <a:cs typeface="Courier New" panose="02070309020205020404" pitchFamily="49" charset="0"/>
+            </a:endParaRPr>
+          </a:p>
+          <a:p>
+            <a:pPr lvl="1">
+              <a:lnSpc>
+                <a:spcPct val="150000"/>
+              </a:lnSpc>
               <a:buSzPct val="120000"/>
               <a:buFont typeface="Courier New" panose="02070309020205020404" pitchFamily="49" charset="0"/>
               <a:buChar char="$"/>
             </a:pPr>
             <a:r>
-              <a:rPr lang="en-CA" dirty="0">
+              <a:rPr lang="en-CA" sz="2000" dirty="0">
                 <a:latin typeface="Courier New" panose="02070309020205020404" pitchFamily="49" charset="0"/>
                 <a:cs typeface="Courier New" panose="02070309020205020404" pitchFamily="49" charset="0"/>
               </a:rPr>
-              <a:t>git add &lt;modified files&gt;</a:t>
-            </a:r>
-          </a:p>
-          <a:p>
-            <a:pPr lvl="2">
+              <a:t>git fetch upstream</a:t>
+            </a:r>
+          </a:p>
+          <a:p>
+            <a:pPr lvl="1">
+              <a:lnSpc>
+                <a:spcPct val="150000"/>
+              </a:lnSpc>
               <a:buSzPct val="120000"/>
               <a:buFont typeface="Courier New" panose="02070309020205020404" pitchFamily="49" charset="0"/>
               <a:buChar char="$"/>
             </a:pPr>
             <a:r>
-              <a:rPr lang="en-CA" dirty="0">
+              <a:rPr lang="en-CA" sz="2000" dirty="0">
                 <a:latin typeface="Courier New" panose="02070309020205020404" pitchFamily="49" charset="0"/>
                 <a:cs typeface="Courier New" panose="02070309020205020404" pitchFamily="49" charset="0"/>
               </a:rPr>
-              <a:t>git commit –m “commit message”</a:t>
-            </a:r>
-          </a:p>
-          <a:p>
-            <a:pPr lvl="2">
+              <a:t>git rebase upstream/main</a:t>
+            </a:r>
+          </a:p>
+          <a:p>
+            <a:pPr lvl="1">
+              <a:lnSpc>
+                <a:spcPct val="150000"/>
+              </a:lnSpc>
               <a:buSzPct val="120000"/>
               <a:buFont typeface="Courier New" panose="02070309020205020404" pitchFamily="49" charset="0"/>
               <a:buChar char="$"/>
             </a:pPr>
             <a:r>
-              <a:rPr lang="en-CA" dirty="0">
+              <a:rPr lang="en-CA" sz="2000" dirty="0">
                 <a:latin typeface="Courier New" panose="02070309020205020404" pitchFamily="49" charset="0"/>
                 <a:cs typeface="Courier New" panose="02070309020205020404" pitchFamily="49" charset="0"/>
               </a:rPr>
-              <a:t>git push origin main</a:t>
-            </a:r>
-          </a:p>
-          <a:p>
-            <a:pPr lvl="1"/>
-            <a:r>
-              <a:rPr lang="en-CA" dirty="0"/>
-              <a:t>Replace </a:t>
-            </a:r>
-            <a:r>
-              <a:rPr lang="en-CA" dirty="0">
-                <a:latin typeface="Courier New" panose="02070309020205020404" pitchFamily="49" charset="0"/>
-                <a:cs typeface="Courier New" panose="02070309020205020404" pitchFamily="49" charset="0"/>
-              </a:rPr>
-              <a:t>&lt;modified files&gt; </a:t>
-            </a:r>
-            <a:r>
-              <a:rPr lang="en-CA" dirty="0"/>
-              <a:t>by the files you changed</a:t>
-            </a:r>
-          </a:p>
-          <a:p>
-            <a:pPr lvl="2"/>
-            <a:r>
-              <a:rPr lang="en-CA" dirty="0">
-                <a:latin typeface="Courier New" panose="02070309020205020404" pitchFamily="49" charset="0"/>
-                <a:cs typeface="Courier New" panose="02070309020205020404" pitchFamily="49" charset="0"/>
-              </a:rPr>
-              <a:t>git status </a:t>
-            </a:r>
-            <a:r>
-              <a:rPr lang="en-CA" dirty="0"/>
-              <a:t>allows you to see all modified files</a:t>
-            </a:r>
-          </a:p>
-          <a:p>
-            <a:pPr lvl="1"/>
-            <a:r>
-              <a:rPr lang="en-CA" dirty="0"/>
-              <a:t>Replace </a:t>
-            </a:r>
-            <a:r>
-              <a:rPr lang="en-CA" dirty="0">
-                <a:latin typeface="Courier New" panose="02070309020205020404" pitchFamily="49" charset="0"/>
-                <a:cs typeface="Courier New" panose="02070309020205020404" pitchFamily="49" charset="0"/>
-              </a:rPr>
-              <a:t>“commit message” </a:t>
-            </a:r>
-            <a:r>
-              <a:rPr lang="en-CA" dirty="0"/>
-              <a:t>with a meaningful commit message</a:t>
+              <a:t>git push –f origin main</a:t>
             </a:r>
           </a:p>
         </p:txBody>
@@ -27993,7 +27341,7 @@
     </p:spTree>
     <p:extLst>
       <p:ext uri="{BB962C8B-B14F-4D97-AF65-F5344CB8AC3E}">
-        <p14:creationId xmlns:p14="http://schemas.microsoft.com/office/powerpoint/2010/main" val="134378743"/>
+        <p14:creationId xmlns:p14="http://schemas.microsoft.com/office/powerpoint/2010/main" val="159535937"/>
       </p:ext>
     </p:extLst>
   </p:cSld>
@@ -28025,7 +27373,7 @@
           <p:cNvPr id="2" name="Title 1">
             <a:extLst>
               <a:ext uri="{FF2B5EF4-FFF2-40B4-BE49-F238E27FC236}">
-                <a16:creationId xmlns:a16="http://schemas.microsoft.com/office/drawing/2014/main" id="{F8A923FB-40CA-9A8A-6B22-02F2284C75DB}"/>
+                <a16:creationId xmlns:a16="http://schemas.microsoft.com/office/drawing/2014/main" id="{63B54037-68BC-B576-EC1A-8457F234559B}"/>
               </a:ext>
             </a:extLst>
           </p:cNvPr>
@@ -28043,103 +27391,580 @@
           <a:p>
             <a:r>
               <a:rPr lang="en-CA" dirty="0"/>
-              <a:t>Git push breakdown</a:t>
+              <a:t>Git terminology</a:t>
             </a:r>
           </a:p>
         </p:txBody>
       </p:sp>
       <p:sp>
         <p:nvSpPr>
-          <p:cNvPr id="3" name="Content Placeholder 2">
+          <p:cNvPr id="4" name="Rectangle 3">
             <a:extLst>
               <a:ext uri="{FF2B5EF4-FFF2-40B4-BE49-F238E27FC236}">
-                <a16:creationId xmlns:a16="http://schemas.microsoft.com/office/drawing/2014/main" id="{4598FED0-95E7-F178-B8FA-7104754FBDEA}"/>
+                <a16:creationId xmlns:a16="http://schemas.microsoft.com/office/drawing/2014/main" id="{3DD6FB4A-5517-8CC4-439A-4F42CF26B732}"/>
               </a:ext>
             </a:extLst>
           </p:cNvPr>
-          <p:cNvSpPr>
-            <a:spLocks noGrp="1"/>
-          </p:cNvSpPr>
-          <p:nvPr>
-            <p:ph idx="1"/>
-          </p:nvPr>
+          <p:cNvSpPr/>
+          <p:nvPr/>
         </p:nvSpPr>
         <p:spPr>
           <a:xfrm>
-            <a:off x="564333" y="2340321"/>
-            <a:ext cx="11063334" cy="4517679"/>
+            <a:off x="1846907" y="2670771"/>
+            <a:ext cx="2643612" cy="1475716"/>
           </a:xfrm>
+          <a:prstGeom prst="rect">
+            <a:avLst/>
+          </a:prstGeom>
+        </p:spPr>
+        <p:style>
+          <a:lnRef idx="2">
+            <a:schemeClr val="accent1">
+              <a:shade val="50000"/>
+            </a:schemeClr>
+          </a:lnRef>
+          <a:fillRef idx="1">
+            <a:schemeClr val="accent1"/>
+          </a:fillRef>
+          <a:effectRef idx="0">
+            <a:schemeClr val="accent1"/>
+          </a:effectRef>
+          <a:fontRef idx="minor">
+            <a:schemeClr val="lt1"/>
+          </a:fontRef>
+        </p:style>
+        <p:txBody>
+          <a:bodyPr rtlCol="0" anchor="ctr"/>
+          <a:lstStyle/>
+          <a:p>
+            <a:pPr algn="ctr"/>
+            <a:r>
+              <a:rPr lang="en-CA" sz="2400" b="1" dirty="0"/>
+              <a:t>Instructor’s repo</a:t>
+            </a:r>
+          </a:p>
+          <a:p>
+            <a:pPr algn="ctr"/>
+            <a:r>
+              <a:rPr lang="en-CA" sz="2400" dirty="0"/>
+              <a:t>[remote]</a:t>
+            </a:r>
+          </a:p>
+          <a:p>
+            <a:pPr algn="ctr"/>
+            <a:r>
+              <a:rPr lang="en-CA" sz="2400" i="1" dirty="0"/>
+              <a:t>upstream</a:t>
+            </a:r>
+          </a:p>
+        </p:txBody>
+      </p:sp>
+      <p:sp>
+        <p:nvSpPr>
+          <p:cNvPr id="7" name="Rectangle 6">
+            <a:extLst>
+              <a:ext uri="{FF2B5EF4-FFF2-40B4-BE49-F238E27FC236}">
+                <a16:creationId xmlns:a16="http://schemas.microsoft.com/office/drawing/2014/main" id="{751C1034-74BB-199F-DC4C-4772086F5366}"/>
+              </a:ext>
+            </a:extLst>
+          </p:cNvPr>
+          <p:cNvSpPr/>
+          <p:nvPr/>
+        </p:nvSpPr>
+        <p:spPr>
+          <a:xfrm>
+            <a:off x="7701483" y="2670771"/>
+            <a:ext cx="2643612" cy="1475716"/>
+          </a:xfrm>
+          <a:prstGeom prst="rect">
+            <a:avLst/>
+          </a:prstGeom>
+        </p:spPr>
+        <p:style>
+          <a:lnRef idx="2">
+            <a:schemeClr val="accent1">
+              <a:shade val="50000"/>
+            </a:schemeClr>
+          </a:lnRef>
+          <a:fillRef idx="1">
+            <a:schemeClr val="accent1"/>
+          </a:fillRef>
+          <a:effectRef idx="0">
+            <a:schemeClr val="accent1"/>
+          </a:effectRef>
+          <a:fontRef idx="minor">
+            <a:schemeClr val="lt1"/>
+          </a:fontRef>
+        </p:style>
+        <p:txBody>
+          <a:bodyPr rtlCol="0" anchor="ctr"/>
+          <a:lstStyle/>
+          <a:p>
+            <a:pPr algn="ctr"/>
+            <a:r>
+              <a:rPr lang="en-CA" sz="2400" b="1" dirty="0"/>
+              <a:t>My forked repo</a:t>
+            </a:r>
+          </a:p>
+          <a:p>
+            <a:pPr algn="ctr"/>
+            <a:r>
+              <a:rPr lang="en-CA" sz="2400" dirty="0"/>
+              <a:t>[remote]</a:t>
+            </a:r>
+          </a:p>
+          <a:p>
+            <a:pPr algn="ctr"/>
+            <a:r>
+              <a:rPr lang="en-CA" sz="2400" i="1" dirty="0"/>
+              <a:t>main</a:t>
+            </a:r>
+          </a:p>
+        </p:txBody>
+      </p:sp>
+      <p:sp>
+        <p:nvSpPr>
+          <p:cNvPr id="8" name="Rectangle 7">
+            <a:extLst>
+              <a:ext uri="{FF2B5EF4-FFF2-40B4-BE49-F238E27FC236}">
+                <a16:creationId xmlns:a16="http://schemas.microsoft.com/office/drawing/2014/main" id="{AA804AFC-DFC1-58C4-300D-9A86772452D0}"/>
+              </a:ext>
+            </a:extLst>
+          </p:cNvPr>
+          <p:cNvSpPr/>
+          <p:nvPr/>
+        </p:nvSpPr>
+        <p:spPr>
+          <a:xfrm>
+            <a:off x="4774194" y="5068430"/>
+            <a:ext cx="2643612" cy="1475716"/>
+          </a:xfrm>
+          <a:prstGeom prst="rect">
+            <a:avLst/>
+          </a:prstGeom>
+        </p:spPr>
+        <p:style>
+          <a:lnRef idx="2">
+            <a:schemeClr val="accent1">
+              <a:shade val="50000"/>
+            </a:schemeClr>
+          </a:lnRef>
+          <a:fillRef idx="1">
+            <a:schemeClr val="accent1"/>
+          </a:fillRef>
+          <a:effectRef idx="0">
+            <a:schemeClr val="accent1"/>
+          </a:effectRef>
+          <a:fontRef idx="minor">
+            <a:schemeClr val="lt1"/>
+          </a:fontRef>
+        </p:style>
+        <p:txBody>
+          <a:bodyPr rtlCol="0" anchor="ctr"/>
+          <a:lstStyle/>
+          <a:p>
+            <a:pPr algn="ctr"/>
+            <a:r>
+              <a:rPr lang="en-CA" sz="2400" b="1" dirty="0"/>
+              <a:t>My local repo</a:t>
+            </a:r>
+          </a:p>
+          <a:p>
+            <a:pPr algn="ctr"/>
+            <a:r>
+              <a:rPr lang="en-CA" sz="2400" dirty="0"/>
+              <a:t>[local]</a:t>
+            </a:r>
+          </a:p>
+          <a:p>
+            <a:pPr algn="ctr"/>
+            <a:r>
+              <a:rPr lang="en-CA" sz="2400" i="1" dirty="0"/>
+              <a:t>origin</a:t>
+            </a:r>
+          </a:p>
+        </p:txBody>
+      </p:sp>
+      <p:cxnSp>
+        <p:nvCxnSpPr>
+          <p:cNvPr id="10" name="Straight Arrow Connector 9">
+            <a:extLst>
+              <a:ext uri="{FF2B5EF4-FFF2-40B4-BE49-F238E27FC236}">
+                <a16:creationId xmlns:a16="http://schemas.microsoft.com/office/drawing/2014/main" id="{1A51553D-A11D-1118-7317-6C8655A89506}"/>
+              </a:ext>
+            </a:extLst>
+          </p:cNvPr>
+          <p:cNvCxnSpPr/>
+          <p:nvPr/>
+        </p:nvCxnSpPr>
+        <p:spPr>
+          <a:xfrm>
+            <a:off x="2987644" y="4227968"/>
+            <a:ext cx="1566249" cy="1502876"/>
+          </a:xfrm>
+          <a:prstGeom prst="straightConnector1">
+            <a:avLst/>
+          </a:prstGeom>
+          <a:ln w="76200">
+            <a:solidFill>
+              <a:schemeClr val="accent3"/>
+            </a:solidFill>
+            <a:tailEnd type="triangle"/>
+          </a:ln>
+        </p:spPr>
+        <p:style>
+          <a:lnRef idx="1">
+            <a:schemeClr val="accent1"/>
+          </a:lnRef>
+          <a:fillRef idx="0">
+            <a:schemeClr val="accent1"/>
+          </a:fillRef>
+          <a:effectRef idx="0">
+            <a:schemeClr val="accent1"/>
+          </a:effectRef>
+          <a:fontRef idx="minor">
+            <a:schemeClr val="tx1"/>
+          </a:fontRef>
+        </p:style>
+      </p:cxnSp>
+      <p:sp>
+        <p:nvSpPr>
+          <p:cNvPr id="11" name="TextBox 10">
+            <a:extLst>
+              <a:ext uri="{FF2B5EF4-FFF2-40B4-BE49-F238E27FC236}">
+                <a16:creationId xmlns:a16="http://schemas.microsoft.com/office/drawing/2014/main" id="{65301409-27C7-17CB-34FB-603B478B107A}"/>
+              </a:ext>
+            </a:extLst>
+          </p:cNvPr>
+          <p:cNvSpPr txBox="1"/>
+          <p:nvPr/>
+        </p:nvSpPr>
+        <p:spPr>
+          <a:xfrm rot="2645474">
+            <a:off x="3001909" y="4779351"/>
+            <a:ext cx="886781" cy="400110"/>
+          </a:xfrm>
+          <a:prstGeom prst="rect">
+            <a:avLst/>
+          </a:prstGeom>
+          <a:noFill/>
         </p:spPr>
         <p:txBody>
-          <a:bodyPr>
-            <a:normAutofit/>
+          <a:bodyPr wrap="none" rtlCol="0">
+            <a:spAutoFit/>
           </a:bodyPr>
           <a:lstStyle/>
           <a:p>
             <a:r>
-              <a:rPr lang="en-CA" sz="2000" dirty="0"/>
-              <a:t>Add:</a:t>
-            </a:r>
-          </a:p>
-          <a:p>
-            <a:pPr lvl="1"/>
-            <a:r>
-              <a:rPr lang="en-CA" sz="1800" dirty="0"/>
-              <a:t>Specifies which files to add to the commit</a:t>
-            </a:r>
-          </a:p>
-          <a:p>
-            <a:pPr lvl="1"/>
-            <a:r>
-              <a:rPr lang="en-CA" sz="1800" dirty="0"/>
-              <a:t>Lets you purposely omit files you do not wish to commit</a:t>
-            </a:r>
-          </a:p>
-          <a:p>
-            <a:r>
-              <a:rPr lang="en-CA" sz="2000" dirty="0"/>
-              <a:t>Commit:</a:t>
-            </a:r>
-          </a:p>
-          <a:p>
-            <a:pPr lvl="1"/>
-            <a:r>
-              <a:rPr lang="en-CA" sz="1800" dirty="0"/>
-              <a:t>It’s in the name: you are “committed” to the changes you made</a:t>
-            </a:r>
-          </a:p>
-          <a:p>
-            <a:pPr lvl="1"/>
-            <a:r>
-              <a:rPr lang="en-CA" sz="1800" dirty="0"/>
-              <a:t>Git commit saves a copy of your files at the moment of the commit</a:t>
-            </a:r>
-          </a:p>
-          <a:p>
-            <a:pPr lvl="1"/>
-            <a:r>
-              <a:rPr lang="en-CA" sz="1800" dirty="0"/>
-              <a:t>Allows you to return to previous versions if need be</a:t>
-            </a:r>
-          </a:p>
-          <a:p>
-            <a:r>
-              <a:rPr lang="en-CA" sz="2000" dirty="0"/>
-              <a:t>Push:</a:t>
-            </a:r>
-          </a:p>
-          <a:p>
-            <a:pPr lvl="1"/>
-            <a:r>
-              <a:rPr lang="en-CA" sz="1800" dirty="0"/>
-              <a:t>Pushes the committed files to the remote directory</a:t>
-            </a:r>
-          </a:p>
-          <a:p>
-            <a:pPr lvl="1"/>
-            <a:r>
-              <a:rPr lang="en-CA" sz="1800" dirty="0"/>
-              <a:t>Now, if you log into GitHub in the browser, you will see the modified files appearing in your repo!</a:t>
+              <a:rPr lang="en-CA" sz="2000" dirty="0">
+                <a:solidFill>
+                  <a:schemeClr val="tx1">
+                    <a:lumMod val="75000"/>
+                    <a:lumOff val="25000"/>
+                  </a:schemeClr>
+                </a:solidFill>
+              </a:rPr>
+              <a:t>Fetch</a:t>
+            </a:r>
+          </a:p>
+        </p:txBody>
+      </p:sp>
+      <p:cxnSp>
+        <p:nvCxnSpPr>
+          <p:cNvPr id="12" name="Straight Arrow Connector 11">
+            <a:extLst>
+              <a:ext uri="{FF2B5EF4-FFF2-40B4-BE49-F238E27FC236}">
+                <a16:creationId xmlns:a16="http://schemas.microsoft.com/office/drawing/2014/main" id="{A79A564B-1D2D-EDA7-1B04-A5F8F54FD852}"/>
+              </a:ext>
+            </a:extLst>
+          </p:cNvPr>
+          <p:cNvCxnSpPr>
+            <a:cxnSpLocks/>
+          </p:cNvCxnSpPr>
+          <p:nvPr/>
+        </p:nvCxnSpPr>
+        <p:spPr>
+          <a:xfrm flipH="1">
+            <a:off x="7499290" y="4227968"/>
+            <a:ext cx="2481732" cy="2061995"/>
+          </a:xfrm>
+          <a:prstGeom prst="straightConnector1">
+            <a:avLst/>
+          </a:prstGeom>
+          <a:ln w="76200">
+            <a:solidFill>
+              <a:schemeClr val="accent3"/>
+            </a:solidFill>
+            <a:tailEnd type="triangle"/>
+          </a:ln>
+        </p:spPr>
+        <p:style>
+          <a:lnRef idx="1">
+            <a:schemeClr val="accent1"/>
+          </a:lnRef>
+          <a:fillRef idx="0">
+            <a:schemeClr val="accent1"/>
+          </a:fillRef>
+          <a:effectRef idx="0">
+            <a:schemeClr val="accent1"/>
+          </a:effectRef>
+          <a:fontRef idx="minor">
+            <a:schemeClr val="tx1"/>
+          </a:fontRef>
+        </p:style>
+      </p:cxnSp>
+      <p:sp>
+        <p:nvSpPr>
+          <p:cNvPr id="16" name="TextBox 15">
+            <a:extLst>
+              <a:ext uri="{FF2B5EF4-FFF2-40B4-BE49-F238E27FC236}">
+                <a16:creationId xmlns:a16="http://schemas.microsoft.com/office/drawing/2014/main" id="{C3E98D18-0A9F-2AF9-5DFE-3C4103A399B2}"/>
+              </a:ext>
+            </a:extLst>
+          </p:cNvPr>
+          <p:cNvSpPr txBox="1"/>
+          <p:nvPr/>
+        </p:nvSpPr>
+        <p:spPr>
+          <a:xfrm rot="19192747">
+            <a:off x="8745392" y="5058910"/>
+            <a:ext cx="595035" cy="400110"/>
+          </a:xfrm>
+          <a:prstGeom prst="rect">
+            <a:avLst/>
+          </a:prstGeom>
+          <a:noFill/>
+        </p:spPr>
+        <p:txBody>
+          <a:bodyPr wrap="none" rtlCol="0">
+            <a:spAutoFit/>
+          </a:bodyPr>
+          <a:lstStyle/>
+          <a:p>
+            <a:r>
+              <a:rPr lang="en-CA" sz="2000" dirty="0">
+                <a:solidFill>
+                  <a:schemeClr val="tx1">
+                    <a:lumMod val="75000"/>
+                    <a:lumOff val="25000"/>
+                  </a:schemeClr>
+                </a:solidFill>
+              </a:rPr>
+              <a:t>Pull</a:t>
+            </a:r>
+          </a:p>
+        </p:txBody>
+      </p:sp>
+      <p:cxnSp>
+        <p:nvCxnSpPr>
+          <p:cNvPr id="17" name="Straight Arrow Connector 16">
+            <a:extLst>
+              <a:ext uri="{FF2B5EF4-FFF2-40B4-BE49-F238E27FC236}">
+                <a16:creationId xmlns:a16="http://schemas.microsoft.com/office/drawing/2014/main" id="{7AD0FFE9-D16C-8539-99D5-F2BC465C575D}"/>
+              </a:ext>
+            </a:extLst>
+          </p:cNvPr>
+          <p:cNvCxnSpPr>
+            <a:cxnSpLocks/>
+          </p:cNvCxnSpPr>
+          <p:nvPr/>
+        </p:nvCxnSpPr>
+        <p:spPr>
+          <a:xfrm flipV="1">
+            <a:off x="7499290" y="4227968"/>
+            <a:ext cx="1413801" cy="1203637"/>
+          </a:xfrm>
+          <a:prstGeom prst="straightConnector1">
+            <a:avLst/>
+          </a:prstGeom>
+          <a:ln w="76200">
+            <a:solidFill>
+              <a:schemeClr val="accent3"/>
+            </a:solidFill>
+            <a:tailEnd type="triangle"/>
+          </a:ln>
+        </p:spPr>
+        <p:style>
+          <a:lnRef idx="1">
+            <a:schemeClr val="accent1"/>
+          </a:lnRef>
+          <a:fillRef idx="0">
+            <a:schemeClr val="accent1"/>
+          </a:fillRef>
+          <a:effectRef idx="0">
+            <a:schemeClr val="accent1"/>
+          </a:effectRef>
+          <a:fontRef idx="minor">
+            <a:schemeClr val="tx1"/>
+          </a:fontRef>
+        </p:style>
+      </p:cxnSp>
+      <p:sp>
+        <p:nvSpPr>
+          <p:cNvPr id="20" name="TextBox 19">
+            <a:extLst>
+              <a:ext uri="{FF2B5EF4-FFF2-40B4-BE49-F238E27FC236}">
+                <a16:creationId xmlns:a16="http://schemas.microsoft.com/office/drawing/2014/main" id="{5BE8265E-FCB7-0290-9EC3-FA75097DE770}"/>
+              </a:ext>
+            </a:extLst>
+          </p:cNvPr>
+          <p:cNvSpPr txBox="1"/>
+          <p:nvPr/>
+        </p:nvSpPr>
+        <p:spPr>
+          <a:xfrm rot="19192747">
+            <a:off x="7669910" y="4478131"/>
+            <a:ext cx="748923" cy="400110"/>
+          </a:xfrm>
+          <a:prstGeom prst="rect">
+            <a:avLst/>
+          </a:prstGeom>
+          <a:noFill/>
+        </p:spPr>
+        <p:txBody>
+          <a:bodyPr wrap="none" rtlCol="0">
+            <a:spAutoFit/>
+          </a:bodyPr>
+          <a:lstStyle/>
+          <a:p>
+            <a:r>
+              <a:rPr lang="en-CA" sz="2000" dirty="0">
+                <a:solidFill>
+                  <a:schemeClr val="tx1">
+                    <a:lumMod val="75000"/>
+                    <a:lumOff val="25000"/>
+                  </a:schemeClr>
+                </a:solidFill>
+              </a:rPr>
+              <a:t>Push</a:t>
+            </a:r>
+          </a:p>
+        </p:txBody>
+      </p:sp>
+      <p:cxnSp>
+        <p:nvCxnSpPr>
+          <p:cNvPr id="21" name="Straight Arrow Connector 20">
+            <a:extLst>
+              <a:ext uri="{FF2B5EF4-FFF2-40B4-BE49-F238E27FC236}">
+                <a16:creationId xmlns:a16="http://schemas.microsoft.com/office/drawing/2014/main" id="{2795C08C-41D1-CEE0-DFB7-43FC8DB37EFB}"/>
+              </a:ext>
+            </a:extLst>
+          </p:cNvPr>
+          <p:cNvCxnSpPr>
+            <a:cxnSpLocks/>
+          </p:cNvCxnSpPr>
+          <p:nvPr/>
+        </p:nvCxnSpPr>
+        <p:spPr>
+          <a:xfrm>
+            <a:off x="4543854" y="3355242"/>
+            <a:ext cx="3085255" cy="0"/>
+          </a:xfrm>
+          <a:prstGeom prst="straightConnector1">
+            <a:avLst/>
+          </a:prstGeom>
+          <a:ln w="76200">
+            <a:solidFill>
+              <a:schemeClr val="accent3"/>
+            </a:solidFill>
+            <a:tailEnd type="triangle"/>
+          </a:ln>
+        </p:spPr>
+        <p:style>
+          <a:lnRef idx="1">
+            <a:schemeClr val="accent1"/>
+          </a:lnRef>
+          <a:fillRef idx="0">
+            <a:schemeClr val="accent1"/>
+          </a:fillRef>
+          <a:effectRef idx="0">
+            <a:schemeClr val="accent1"/>
+          </a:effectRef>
+          <a:fontRef idx="minor">
+            <a:schemeClr val="tx1"/>
+          </a:fontRef>
+        </p:style>
+      </p:cxnSp>
+      <p:sp>
+        <p:nvSpPr>
+          <p:cNvPr id="23" name="TextBox 22">
+            <a:extLst>
+              <a:ext uri="{FF2B5EF4-FFF2-40B4-BE49-F238E27FC236}">
+                <a16:creationId xmlns:a16="http://schemas.microsoft.com/office/drawing/2014/main" id="{593175FC-D5AA-7EAE-9732-E0882A07F5DE}"/>
+              </a:ext>
+            </a:extLst>
+          </p:cNvPr>
+          <p:cNvSpPr txBox="1"/>
+          <p:nvPr/>
+        </p:nvSpPr>
+        <p:spPr>
+          <a:xfrm>
+            <a:off x="5744881" y="2887177"/>
+            <a:ext cx="683200" cy="400110"/>
+          </a:xfrm>
+          <a:prstGeom prst="rect">
+            <a:avLst/>
+          </a:prstGeom>
+          <a:noFill/>
+        </p:spPr>
+        <p:txBody>
+          <a:bodyPr wrap="none" rtlCol="0">
+            <a:spAutoFit/>
+          </a:bodyPr>
+          <a:lstStyle/>
+          <a:p>
+            <a:r>
+              <a:rPr lang="en-CA" sz="2000" dirty="0">
+                <a:solidFill>
+                  <a:schemeClr val="tx1">
+                    <a:lumMod val="75000"/>
+                    <a:lumOff val="25000"/>
+                  </a:schemeClr>
+                </a:solidFill>
+              </a:rPr>
+              <a:t>Fork</a:t>
+            </a:r>
+          </a:p>
+        </p:txBody>
+      </p:sp>
+      <p:sp>
+        <p:nvSpPr>
+          <p:cNvPr id="14" name="TextBox 13">
+            <a:extLst>
+              <a:ext uri="{FF2B5EF4-FFF2-40B4-BE49-F238E27FC236}">
+                <a16:creationId xmlns:a16="http://schemas.microsoft.com/office/drawing/2014/main" id="{7A349DF9-05C6-F709-F6C5-106FA7C5E894}"/>
+              </a:ext>
+            </a:extLst>
+          </p:cNvPr>
+          <p:cNvSpPr txBox="1"/>
+          <p:nvPr/>
+        </p:nvSpPr>
+        <p:spPr>
+          <a:xfrm rot="2645474">
+            <a:off x="2871195" y="5030735"/>
+            <a:ext cx="595035" cy="400110"/>
+          </a:xfrm>
+          <a:prstGeom prst="rect">
+            <a:avLst/>
+          </a:prstGeom>
+          <a:noFill/>
+        </p:spPr>
+        <p:txBody>
+          <a:bodyPr wrap="none" rtlCol="0">
+            <a:spAutoFit/>
+          </a:bodyPr>
+          <a:lstStyle/>
+          <a:p>
+            <a:r>
+              <a:rPr lang="en-CA" sz="2000" dirty="0">
+                <a:solidFill>
+                  <a:schemeClr val="tx1">
+                    <a:lumMod val="75000"/>
+                    <a:lumOff val="25000"/>
+                  </a:schemeClr>
+                </a:solidFill>
+              </a:rPr>
+              <a:t>Pull</a:t>
             </a:r>
           </a:p>
         </p:txBody>
@@ -28147,13 +27972,348 @@
     </p:spTree>
     <p:extLst>
       <p:ext uri="{BB962C8B-B14F-4D97-AF65-F5344CB8AC3E}">
-        <p14:creationId xmlns:p14="http://schemas.microsoft.com/office/powerpoint/2010/main" val="3040405518"/>
+        <p14:creationId xmlns:p14="http://schemas.microsoft.com/office/powerpoint/2010/main" val="824081583"/>
       </p:ext>
     </p:extLst>
   </p:cSld>
   <p:clrMapOvr>
     <a:masterClrMapping/>
   </p:clrMapOvr>
+  <p:timing>
+    <p:tnLst>
+      <p:par>
+        <p:cTn id="1" dur="indefinite" restart="never" nodeType="tmRoot">
+          <p:childTnLst>
+            <p:seq concurrent="1" nextAc="seek">
+              <p:cTn id="2" dur="indefinite" nodeType="mainSeq">
+                <p:childTnLst>
+                  <p:par>
+                    <p:cTn id="3" fill="hold">
+                      <p:stCondLst>
+                        <p:cond delay="indefinite"/>
+                      </p:stCondLst>
+                      <p:childTnLst>
+                        <p:par>
+                          <p:cTn id="4" fill="hold">
+                            <p:stCondLst>
+                              <p:cond delay="0"/>
+                            </p:stCondLst>
+                            <p:childTnLst>
+                              <p:par>
+                                <p:cTn id="5" presetID="10" presetClass="entr" presetSubtype="0" fill="hold" nodeType="clickEffect">
+                                  <p:stCondLst>
+                                    <p:cond delay="0"/>
+                                  </p:stCondLst>
+                                  <p:childTnLst>
+                                    <p:set>
+                                      <p:cBhvr>
+                                        <p:cTn id="6" dur="1" fill="hold">
+                                          <p:stCondLst>
+                                            <p:cond delay="0"/>
+                                          </p:stCondLst>
+                                        </p:cTn>
+                                        <p:tgtEl>
+                                          <p:spTgt spid="10"/>
+                                        </p:tgtEl>
+                                        <p:attrNameLst>
+                                          <p:attrName>style.visibility</p:attrName>
+                                        </p:attrNameLst>
+                                      </p:cBhvr>
+                                      <p:to>
+                                        <p:strVal val="visible"/>
+                                      </p:to>
+                                    </p:set>
+                                    <p:animEffect transition="in" filter="fade">
+                                      <p:cBhvr>
+                                        <p:cTn id="7" dur="500"/>
+                                        <p:tgtEl>
+                                          <p:spTgt spid="10"/>
+                                        </p:tgtEl>
+                                      </p:cBhvr>
+                                    </p:animEffect>
+                                  </p:childTnLst>
+                                </p:cTn>
+                              </p:par>
+                              <p:par>
+                                <p:cTn id="8" presetID="10" presetClass="entr" presetSubtype="0" fill="hold" grpId="0" nodeType="withEffect">
+                                  <p:stCondLst>
+                                    <p:cond delay="0"/>
+                                  </p:stCondLst>
+                                  <p:childTnLst>
+                                    <p:set>
+                                      <p:cBhvr>
+                                        <p:cTn id="9" dur="1" fill="hold">
+                                          <p:stCondLst>
+                                            <p:cond delay="0"/>
+                                          </p:stCondLst>
+                                        </p:cTn>
+                                        <p:tgtEl>
+                                          <p:spTgt spid="11"/>
+                                        </p:tgtEl>
+                                        <p:attrNameLst>
+                                          <p:attrName>style.visibility</p:attrName>
+                                        </p:attrNameLst>
+                                      </p:cBhvr>
+                                      <p:to>
+                                        <p:strVal val="visible"/>
+                                      </p:to>
+                                    </p:set>
+                                    <p:animEffect transition="in" filter="fade">
+                                      <p:cBhvr>
+                                        <p:cTn id="10" dur="500"/>
+                                        <p:tgtEl>
+                                          <p:spTgt spid="11"/>
+                                        </p:tgtEl>
+                                      </p:cBhvr>
+                                    </p:animEffect>
+                                  </p:childTnLst>
+                                </p:cTn>
+                              </p:par>
+                              <p:par>
+                                <p:cTn id="11" presetID="10" presetClass="entr" presetSubtype="0" fill="hold" grpId="0" nodeType="withEffect">
+                                  <p:stCondLst>
+                                    <p:cond delay="0"/>
+                                  </p:stCondLst>
+                                  <p:childTnLst>
+                                    <p:set>
+                                      <p:cBhvr>
+                                        <p:cTn id="12" dur="1" fill="hold">
+                                          <p:stCondLst>
+                                            <p:cond delay="0"/>
+                                          </p:stCondLst>
+                                        </p:cTn>
+                                        <p:tgtEl>
+                                          <p:spTgt spid="8"/>
+                                        </p:tgtEl>
+                                        <p:attrNameLst>
+                                          <p:attrName>style.visibility</p:attrName>
+                                        </p:attrNameLst>
+                                      </p:cBhvr>
+                                      <p:to>
+                                        <p:strVal val="visible"/>
+                                      </p:to>
+                                    </p:set>
+                                    <p:animEffect transition="in" filter="fade">
+                                      <p:cBhvr>
+                                        <p:cTn id="13" dur="500"/>
+                                        <p:tgtEl>
+                                          <p:spTgt spid="8"/>
+                                        </p:tgtEl>
+                                      </p:cBhvr>
+                                    </p:animEffect>
+                                  </p:childTnLst>
+                                </p:cTn>
+                              </p:par>
+                              <p:par>
+                                <p:cTn id="14" presetID="10" presetClass="entr" presetSubtype="0" fill="hold" grpId="0" nodeType="withEffect">
+                                  <p:stCondLst>
+                                    <p:cond delay="0"/>
+                                  </p:stCondLst>
+                                  <p:childTnLst>
+                                    <p:set>
+                                      <p:cBhvr>
+                                        <p:cTn id="15" dur="1" fill="hold">
+                                          <p:stCondLst>
+                                            <p:cond delay="0"/>
+                                          </p:stCondLst>
+                                        </p:cTn>
+                                        <p:tgtEl>
+                                          <p:spTgt spid="20"/>
+                                        </p:tgtEl>
+                                        <p:attrNameLst>
+                                          <p:attrName>style.visibility</p:attrName>
+                                        </p:attrNameLst>
+                                      </p:cBhvr>
+                                      <p:to>
+                                        <p:strVal val="visible"/>
+                                      </p:to>
+                                    </p:set>
+                                    <p:animEffect transition="in" filter="fade">
+                                      <p:cBhvr>
+                                        <p:cTn id="16" dur="500"/>
+                                        <p:tgtEl>
+                                          <p:spTgt spid="20"/>
+                                        </p:tgtEl>
+                                      </p:cBhvr>
+                                    </p:animEffect>
+                                  </p:childTnLst>
+                                </p:cTn>
+                              </p:par>
+                              <p:par>
+                                <p:cTn id="17" presetID="10" presetClass="entr" presetSubtype="0" fill="hold" nodeType="withEffect">
+                                  <p:stCondLst>
+                                    <p:cond delay="0"/>
+                                  </p:stCondLst>
+                                  <p:childTnLst>
+                                    <p:set>
+                                      <p:cBhvr>
+                                        <p:cTn id="18" dur="1" fill="hold">
+                                          <p:stCondLst>
+                                            <p:cond delay="0"/>
+                                          </p:stCondLst>
+                                        </p:cTn>
+                                        <p:tgtEl>
+                                          <p:spTgt spid="17"/>
+                                        </p:tgtEl>
+                                        <p:attrNameLst>
+                                          <p:attrName>style.visibility</p:attrName>
+                                        </p:attrNameLst>
+                                      </p:cBhvr>
+                                      <p:to>
+                                        <p:strVal val="visible"/>
+                                      </p:to>
+                                    </p:set>
+                                    <p:animEffect transition="in" filter="fade">
+                                      <p:cBhvr>
+                                        <p:cTn id="19" dur="500"/>
+                                        <p:tgtEl>
+                                          <p:spTgt spid="17"/>
+                                        </p:tgtEl>
+                                      </p:cBhvr>
+                                    </p:animEffect>
+                                  </p:childTnLst>
+                                </p:cTn>
+                              </p:par>
+                              <p:par>
+                                <p:cTn id="20" presetID="10" presetClass="entr" presetSubtype="0" fill="hold" nodeType="withEffect">
+                                  <p:stCondLst>
+                                    <p:cond delay="0"/>
+                                  </p:stCondLst>
+                                  <p:childTnLst>
+                                    <p:set>
+                                      <p:cBhvr>
+                                        <p:cTn id="21" dur="1" fill="hold">
+                                          <p:stCondLst>
+                                            <p:cond delay="0"/>
+                                          </p:stCondLst>
+                                        </p:cTn>
+                                        <p:tgtEl>
+                                          <p:spTgt spid="12"/>
+                                        </p:tgtEl>
+                                        <p:attrNameLst>
+                                          <p:attrName>style.visibility</p:attrName>
+                                        </p:attrNameLst>
+                                      </p:cBhvr>
+                                      <p:to>
+                                        <p:strVal val="visible"/>
+                                      </p:to>
+                                    </p:set>
+                                    <p:animEffect transition="in" filter="fade">
+                                      <p:cBhvr>
+                                        <p:cTn id="22" dur="500"/>
+                                        <p:tgtEl>
+                                          <p:spTgt spid="12"/>
+                                        </p:tgtEl>
+                                      </p:cBhvr>
+                                    </p:animEffect>
+                                  </p:childTnLst>
+                                </p:cTn>
+                              </p:par>
+                              <p:par>
+                                <p:cTn id="23" presetID="10" presetClass="entr" presetSubtype="0" fill="hold" grpId="0" nodeType="withEffect">
+                                  <p:stCondLst>
+                                    <p:cond delay="0"/>
+                                  </p:stCondLst>
+                                  <p:childTnLst>
+                                    <p:set>
+                                      <p:cBhvr>
+                                        <p:cTn id="24" dur="1" fill="hold">
+                                          <p:stCondLst>
+                                            <p:cond delay="0"/>
+                                          </p:stCondLst>
+                                        </p:cTn>
+                                        <p:tgtEl>
+                                          <p:spTgt spid="16"/>
+                                        </p:tgtEl>
+                                        <p:attrNameLst>
+                                          <p:attrName>style.visibility</p:attrName>
+                                        </p:attrNameLst>
+                                      </p:cBhvr>
+                                      <p:to>
+                                        <p:strVal val="visible"/>
+                                      </p:to>
+                                    </p:set>
+                                    <p:animEffect transition="in" filter="fade">
+                                      <p:cBhvr>
+                                        <p:cTn id="25" dur="500"/>
+                                        <p:tgtEl>
+                                          <p:spTgt spid="16"/>
+                                        </p:tgtEl>
+                                      </p:cBhvr>
+                                    </p:animEffect>
+                                  </p:childTnLst>
+                                </p:cTn>
+                              </p:par>
+                              <p:par>
+                                <p:cTn id="26" presetID="10" presetClass="entr" presetSubtype="0" fill="hold" grpId="0" nodeType="withEffect">
+                                  <p:stCondLst>
+                                    <p:cond delay="0"/>
+                                  </p:stCondLst>
+                                  <p:childTnLst>
+                                    <p:set>
+                                      <p:cBhvr>
+                                        <p:cTn id="27" dur="1" fill="hold">
+                                          <p:stCondLst>
+                                            <p:cond delay="0"/>
+                                          </p:stCondLst>
+                                        </p:cTn>
+                                        <p:tgtEl>
+                                          <p:spTgt spid="14"/>
+                                        </p:tgtEl>
+                                        <p:attrNameLst>
+                                          <p:attrName>style.visibility</p:attrName>
+                                        </p:attrNameLst>
+                                      </p:cBhvr>
+                                      <p:to>
+                                        <p:strVal val="visible"/>
+                                      </p:to>
+                                    </p:set>
+                                    <p:animEffect transition="in" filter="fade">
+                                      <p:cBhvr>
+                                        <p:cTn id="28" dur="500"/>
+                                        <p:tgtEl>
+                                          <p:spTgt spid="14"/>
+                                        </p:tgtEl>
+                                      </p:cBhvr>
+                                    </p:animEffect>
+                                  </p:childTnLst>
+                                </p:cTn>
+                              </p:par>
+                            </p:childTnLst>
+                          </p:cTn>
+                        </p:par>
+                      </p:childTnLst>
+                    </p:cTn>
+                  </p:par>
+                </p:childTnLst>
+              </p:cTn>
+              <p:prevCondLst>
+                <p:cond evt="onPrev" delay="0">
+                  <p:tgtEl>
+                    <p:sldTgt/>
+                  </p:tgtEl>
+                </p:cond>
+              </p:prevCondLst>
+              <p:nextCondLst>
+                <p:cond evt="onNext" delay="0">
+                  <p:tgtEl>
+                    <p:sldTgt/>
+                  </p:tgtEl>
+                </p:cond>
+              </p:nextCondLst>
+            </p:seq>
+          </p:childTnLst>
+        </p:cTn>
+      </p:par>
+    </p:tnLst>
+    <p:bldLst>
+      <p:bldP spid="8" grpId="0" animBg="1"/>
+      <p:bldP spid="11" grpId="0"/>
+      <p:bldP spid="16" grpId="0"/>
+      <p:bldP spid="20" grpId="0"/>
+      <p:bldP spid="14" grpId="0"/>
+    </p:bldLst>
+  </p:timing>
 </p:sld>
 </file>
 
@@ -28179,7 +28339,7 @@
           <p:cNvPr id="2" name="Title 1">
             <a:extLst>
               <a:ext uri="{FF2B5EF4-FFF2-40B4-BE49-F238E27FC236}">
-                <a16:creationId xmlns:a16="http://schemas.microsoft.com/office/drawing/2014/main" id="{4FB8D1F2-D454-14FA-761A-43711947AABF}"/>
+                <a16:creationId xmlns:a16="http://schemas.microsoft.com/office/drawing/2014/main" id="{63B54037-68BC-B576-EC1A-8457F234559B}"/>
               </a:ext>
             </a:extLst>
           </p:cNvPr>
@@ -28197,18 +28357,21 @@
           <a:p>
             <a:r>
               <a:rPr lang="en-US" dirty="0"/>
-              <a:t>Pull Remote Changes Using Git</a:t>
-            </a:r>
-            <a:endParaRPr lang="en-CA" dirty="0"/>
+              <a:t>!</a:t>
+            </a:r>
+            <a:r>
+              <a:rPr lang="en-CA" dirty="0"/>
+              <a:t>! Important !!</a:t>
+            </a:r>
           </a:p>
         </p:txBody>
       </p:sp>
       <p:sp>
         <p:nvSpPr>
-          <p:cNvPr id="3" name="Content Placeholder 2">
+          <p:cNvPr id="15" name="Content Placeholder 2">
             <a:extLst>
               <a:ext uri="{FF2B5EF4-FFF2-40B4-BE49-F238E27FC236}">
-                <a16:creationId xmlns:a16="http://schemas.microsoft.com/office/drawing/2014/main" id="{C359DBF5-EBA9-4FA6-BD3C-A08979427A39}"/>
+                <a16:creationId xmlns:a16="http://schemas.microsoft.com/office/drawing/2014/main" id="{9DEE4A0D-DF8E-FA74-7AE7-4A798861F8BC}"/>
               </a:ext>
             </a:extLst>
           </p:cNvPr>
@@ -28221,8 +28384,8 @@
         </p:nvSpPr>
         <p:spPr>
           <a:xfrm>
-            <a:off x="387790" y="2218099"/>
-            <a:ext cx="11416419" cy="4639901"/>
+            <a:off x="136189" y="2532434"/>
+            <a:ext cx="7714034" cy="3897086"/>
           </a:xfrm>
         </p:spPr>
         <p:txBody>
@@ -28237,8 +28400,19 @@
               </a:lnSpc>
             </a:pPr>
             <a:r>
-              <a:rPr lang="en-CA" sz="2400" dirty="0"/>
-              <a:t>We need to “pull” changes from the instructor’s repository on GitHub to access latest version each week</a:t>
+              <a:rPr lang="en-US" sz="2000" dirty="0"/>
+              <a:t>Here I explain how to fix the merge conflict you are probably getting at the </a:t>
+            </a:r>
+            <a:r>
+              <a:rPr lang="en-US" sz="2000" dirty="0">
+                <a:latin typeface="Courier New" panose="02070309020205020404" pitchFamily="49" charset="0"/>
+                <a:cs typeface="Courier New" panose="02070309020205020404" pitchFamily="49" charset="0"/>
+              </a:rPr>
+              <a:t>git fetch upstream </a:t>
+            </a:r>
+            <a:r>
+              <a:rPr lang="en-US" sz="2000" dirty="0"/>
+              <a:t>part (watch the recording if unsure)</a:t>
             </a:r>
           </a:p>
           <a:p>
@@ -28248,97 +28422,69 @@
               </a:lnSpc>
             </a:pPr>
             <a:r>
-              <a:rPr lang="en-CA" sz="2400" dirty="0"/>
-              <a:t>Type the following commands in the Git Bash:</a:t>
-            </a:r>
-            <a:endParaRPr lang="en-CA" sz="2000" dirty="0"/>
-          </a:p>
-          <a:p>
-            <a:pPr lvl="1">
+              <a:rPr lang="en-US" sz="2000" dirty="0"/>
+              <a:t>This is my mistake, I forgot something important last week!</a:t>
+            </a:r>
+          </a:p>
+          <a:p>
+            <a:pPr>
               <a:lnSpc>
                 <a:spcPct val="150000"/>
               </a:lnSpc>
-              <a:buSzPct val="120000"/>
-              <a:buFont typeface="Courier New" panose="02070309020205020404" pitchFamily="49" charset="0"/>
-              <a:buChar char="$"/>
             </a:pPr>
             <a:r>
-              <a:rPr lang="en-CA" sz="2000" dirty="0">
-                <a:latin typeface="Courier New" panose="02070309020205020404" pitchFamily="49" charset="0"/>
-                <a:cs typeface="Courier New" panose="02070309020205020404" pitchFamily="49" charset="0"/>
-              </a:rPr>
-              <a:t>git remote add upstream </a:t>
-            </a:r>
-            <a:r>
-              <a:rPr lang="en-CA" sz="2000" dirty="0">
-                <a:latin typeface="Courier New" panose="02070309020205020404" pitchFamily="49" charset="0"/>
-                <a:cs typeface="Courier New" panose="02070309020205020404" pitchFamily="49" charset="0"/>
-                <a:hlinkClick r:id="rId2"/>
-              </a:rPr>
-              <a:t>https://github.com/baron-de-montrouge/Intro-to-Python.git</a:t>
-            </a:r>
-            <a:endParaRPr lang="en-CA" sz="2000" dirty="0">
-              <a:latin typeface="Courier New" panose="02070309020205020404" pitchFamily="49" charset="0"/>
-              <a:cs typeface="Courier New" panose="02070309020205020404" pitchFamily="49" charset="0"/>
-            </a:endParaRPr>
-          </a:p>
-          <a:p>
-            <a:pPr lvl="1">
+              <a:rPr lang="en-US" sz="2000" dirty="0"/>
+              <a:t>You will need to create a separate folder in Intro-to-Python, call it for example “My code”</a:t>
+            </a:r>
+          </a:p>
+          <a:p>
+            <a:pPr>
               <a:lnSpc>
                 <a:spcPct val="150000"/>
               </a:lnSpc>
-              <a:buSzPct val="120000"/>
-              <a:buFont typeface="Courier New" panose="02070309020205020404" pitchFamily="49" charset="0"/>
-              <a:buChar char="$"/>
             </a:pPr>
             <a:r>
-              <a:rPr lang="en-CA" sz="2000" dirty="0">
-                <a:latin typeface="Courier New" panose="02070309020205020404" pitchFamily="49" charset="0"/>
-                <a:cs typeface="Courier New" panose="02070309020205020404" pitchFamily="49" charset="0"/>
-              </a:rPr>
-              <a:t>git fetch upstream</a:t>
-            </a:r>
-          </a:p>
-          <a:p>
-            <a:pPr lvl="1">
-              <a:lnSpc>
-                <a:spcPct val="150000"/>
-              </a:lnSpc>
-              <a:buSzPct val="120000"/>
-              <a:buFont typeface="Courier New" panose="02070309020205020404" pitchFamily="49" charset="0"/>
-              <a:buChar char="$"/>
-            </a:pPr>
-            <a:r>
-              <a:rPr lang="en-CA" sz="2000" dirty="0">
-                <a:latin typeface="Courier New" panose="02070309020205020404" pitchFamily="49" charset="0"/>
-                <a:cs typeface="Courier New" panose="02070309020205020404" pitchFamily="49" charset="0"/>
-              </a:rPr>
-              <a:t>git rebase upstream/main</a:t>
-            </a:r>
-          </a:p>
-          <a:p>
-            <a:pPr lvl="1">
-              <a:lnSpc>
-                <a:spcPct val="150000"/>
-              </a:lnSpc>
-              <a:buSzPct val="120000"/>
-              <a:buFont typeface="Courier New" panose="02070309020205020404" pitchFamily="49" charset="0"/>
-              <a:buChar char="$"/>
-            </a:pPr>
-            <a:r>
-              <a:rPr lang="en-CA" sz="2000" dirty="0">
-                <a:latin typeface="Courier New" panose="02070309020205020404" pitchFamily="49" charset="0"/>
-                <a:cs typeface="Courier New" panose="02070309020205020404" pitchFamily="49" charset="0"/>
-              </a:rPr>
-              <a:t>git push –f origin main</a:t>
-            </a:r>
+              <a:rPr lang="en-US" sz="2000" dirty="0"/>
+              <a:t>Your Intro-to-Python directory should now look like this:</a:t>
+            </a:r>
+            <a:endParaRPr lang="en-CA" sz="2000" dirty="0"/>
           </a:p>
         </p:txBody>
       </p:sp>
+      <p:pic>
+        <p:nvPicPr>
+          <p:cNvPr id="5" name="Picture 4">
+            <a:extLst>
+              <a:ext uri="{FF2B5EF4-FFF2-40B4-BE49-F238E27FC236}">
+                <a16:creationId xmlns:a16="http://schemas.microsoft.com/office/drawing/2014/main" id="{34E4C9A3-0017-B5F2-E7F1-D7349F2AA636}"/>
+              </a:ext>
+            </a:extLst>
+          </p:cNvPr>
+          <p:cNvPicPr>
+            <a:picLocks noChangeAspect="1"/>
+          </p:cNvPicPr>
+          <p:nvPr/>
+        </p:nvPicPr>
+        <p:blipFill>
+          <a:blip r:embed="rId2"/>
+          <a:stretch>
+            <a:fillRect/>
+          </a:stretch>
+        </p:blipFill>
+        <p:spPr>
+          <a:xfrm>
+            <a:off x="8078272" y="3892813"/>
+            <a:ext cx="3676189" cy="2536707"/>
+          </a:xfrm>
+          <a:prstGeom prst="rect">
+            <a:avLst/>
+          </a:prstGeom>
+        </p:spPr>
+      </p:pic>
     </p:spTree>
     <p:extLst>
       <p:ext uri="{BB962C8B-B14F-4D97-AF65-F5344CB8AC3E}">
-        <p14:creationId xmlns:p14="http://schemas.microsoft.com/office/powerpoint/2010/main" val="159535937"/>
+        <p14:creationId xmlns:p14="http://schemas.microsoft.com/office/powerpoint/2010/main" val="2929798607"/>
       </p:ext>
     </p:extLst>
   </p:cSld>

</xml_diff>

<commit_message>
Finished everything for Week 3
</commit_message>
<xml_diff>
--- a/PPTs/Week2.pptx
+++ b/PPTs/Week2.pptx
@@ -14064,7 +14064,7 @@
         <p:spPr>
           <a:xfrm>
             <a:off x="1627872" y="3402127"/>
-            <a:ext cx="8880957" cy="584775"/>
+            <a:ext cx="8536311" cy="584775"/>
           </a:xfrm>
           <a:prstGeom prst="rect">
             <a:avLst/>
@@ -14079,7 +14079,7 @@
           <a:p>
             <a:r>
               <a:rPr lang="en-US" sz="3200" b="1" dirty="0"/>
-              <a:t>error codes, for loops, if statements, and lists</a:t>
+              <a:t>error codes, loops, if statements, and lists</a:t>
             </a:r>
             <a:endParaRPr lang="en-CA" sz="3200" dirty="0"/>
           </a:p>

</xml_diff>